<commit_message>
Substituído ficheiro antigo dos slides por versão mais recente
(tinhamo-nos esquecido de enviar a versão mais recente para o git)
</commit_message>
<xml_diff>
--- a/Slides_apresentação.pptx
+++ b/Slides_apresentação.pptx
@@ -5,21 +5,25 @@
     <p:sldMasterId id="2147483897" r:id="rId2"/>
   </p:sldMasterIdLst>
   <p:notesMasterIdLst>
-    <p:notesMasterId r:id="rId15"/>
+    <p:notesMasterId r:id="rId19"/>
   </p:notesMasterIdLst>
   <p:sldIdLst>
     <p:sldId id="256" r:id="rId3"/>
     <p:sldId id="278" r:id="rId4"/>
     <p:sldId id="265" r:id="rId5"/>
     <p:sldId id="270" r:id="rId6"/>
-    <p:sldId id="271" r:id="rId7"/>
-    <p:sldId id="272" r:id="rId8"/>
-    <p:sldId id="274" r:id="rId9"/>
-    <p:sldId id="273" r:id="rId10"/>
-    <p:sldId id="275" r:id="rId11"/>
-    <p:sldId id="280" r:id="rId12"/>
-    <p:sldId id="281" r:id="rId13"/>
-    <p:sldId id="276" r:id="rId14"/>
+    <p:sldId id="272" r:id="rId7"/>
+    <p:sldId id="273" r:id="rId8"/>
+    <p:sldId id="284" r:id="rId9"/>
+    <p:sldId id="281" r:id="rId10"/>
+    <p:sldId id="285" r:id="rId11"/>
+    <p:sldId id="289" r:id="rId12"/>
+    <p:sldId id="288" r:id="rId13"/>
+    <p:sldId id="287" r:id="rId14"/>
+    <p:sldId id="276" r:id="rId15"/>
+    <p:sldId id="290" r:id="rId16"/>
+    <p:sldId id="291" r:id="rId17"/>
+    <p:sldId id="292" r:id="rId18"/>
   </p:sldIdLst>
   <p:sldSz cx="9144000" cy="5143500" type="screen16x9"/>
   <p:notesSz cx="6858000" cy="9144000"/>
@@ -229,7 +233,7 @@
             <a:fld id="{A8ADFD5B-A66C-449C-B6E8-FB716D07777D}" type="datetimeFigureOut">
               <a:rPr lang="pt-PT"/>
               <a:pPr/>
-              <a:t>17/01/2017</a:t>
+              <a:t>23/01/2017</a:t>
             </a:fld>
             <a:endParaRPr lang="pt-PT"/>
           </a:p>
@@ -662,7 +666,7 @@
     </p:spTree>
     <p:extLst>
       <p:ext uri="{BB962C8B-B14F-4D97-AF65-F5344CB8AC3E}">
-        <p14:creationId xmlns:p14="http://schemas.microsoft.com/office/powerpoint/2010/main" val="875769614"/>
+        <p14:creationId xmlns:p14="http://schemas.microsoft.com/office/powerpoint/2010/main" val="2765359286"/>
       </p:ext>
     </p:extLst>
   </p:cSld>
@@ -739,6 +743,91 @@
               <a:rPr lang="pt-PT" smtClean="0"/>
               <a:pPr/>
               <a:t>12</a:t>
+            </a:fld>
+            <a:endParaRPr lang="pt-PT"/>
+          </a:p>
+        </p:txBody>
+      </p:sp>
+    </p:spTree>
+    <p:extLst>
+      <p:ext uri="{BB962C8B-B14F-4D97-AF65-F5344CB8AC3E}">
+        <p14:creationId xmlns:p14="http://schemas.microsoft.com/office/powerpoint/2010/main" val="3788336381"/>
+      </p:ext>
+    </p:extLst>
+  </p:cSld>
+  <p:clrMapOvr>
+    <a:masterClrMapping/>
+  </p:clrMapOvr>
+</p:notes>
+</file>
+
+<file path=ppt/notesSlides/notesSlide12.xml><?xml version="1.0" encoding="utf-8"?>
+<p:notes xmlns:a="http://schemas.openxmlformats.org/drawingml/2006/main" xmlns:r="http://schemas.openxmlformats.org/officeDocument/2006/relationships" xmlns:p="http://schemas.openxmlformats.org/presentationml/2006/main">
+  <p:cSld>
+    <p:spTree>
+      <p:nvGrpSpPr>
+        <p:cNvPr id="1" name=""/>
+        <p:cNvGrpSpPr/>
+        <p:nvPr/>
+      </p:nvGrpSpPr>
+      <p:grpSpPr>
+        <a:xfrm>
+          <a:off x="0" y="0"/>
+          <a:ext cx="0" cy="0"/>
+          <a:chOff x="0" y="0"/>
+          <a:chExt cx="0" cy="0"/>
+        </a:xfrm>
+      </p:grpSpPr>
+      <p:sp>
+        <p:nvSpPr>
+          <p:cNvPr id="2" name="Marcador de Posição da Imagem do Diapositivo 1"/>
+          <p:cNvSpPr>
+            <a:spLocks noGrp="1" noRot="1" noChangeAspect="1"/>
+          </p:cNvSpPr>
+          <p:nvPr>
+            <p:ph type="sldImg"/>
+          </p:nvPr>
+        </p:nvSpPr>
+        <p:spPr/>
+      </p:sp>
+      <p:sp>
+        <p:nvSpPr>
+          <p:cNvPr id="3" name="Marcador de Posição de Notas 2"/>
+          <p:cNvSpPr>
+            <a:spLocks noGrp="1"/>
+          </p:cNvSpPr>
+          <p:nvPr>
+            <p:ph type="body" idx="1"/>
+          </p:nvPr>
+        </p:nvSpPr>
+        <p:spPr/>
+        <p:txBody>
+          <a:bodyPr/>
+          <a:lstStyle/>
+          <a:p>
+            <a:endParaRPr lang="pt-PT" dirty="0"/>
+          </a:p>
+        </p:txBody>
+      </p:sp>
+      <p:sp>
+        <p:nvSpPr>
+          <p:cNvPr id="4" name="Marcador de Posição do Número do Diapositivo 3"/>
+          <p:cNvSpPr>
+            <a:spLocks noGrp="1"/>
+          </p:cNvSpPr>
+          <p:nvPr>
+            <p:ph type="sldNum" sz="quarter" idx="10"/>
+          </p:nvPr>
+        </p:nvSpPr>
+        <p:spPr/>
+        <p:txBody>
+          <a:bodyPr/>
+          <a:lstStyle/>
+          <a:p>
+            <a:fld id="{CA5D3BF3-D352-46FC-8343-31F56E6730EA}" type="slidenum">
+              <a:rPr lang="pt-PT" smtClean="0"/>
+              <a:pPr/>
+              <a:t>13</a:t>
             </a:fld>
             <a:endParaRPr lang="pt-PT"/>
           </a:p>
@@ -1002,7 +1091,7 @@
     </p:spTree>
     <p:extLst>
       <p:ext uri="{BB962C8B-B14F-4D97-AF65-F5344CB8AC3E}">
-        <p14:creationId xmlns:p14="http://schemas.microsoft.com/office/powerpoint/2010/main" val="2493795192"/>
+        <p14:creationId xmlns:p14="http://schemas.microsoft.com/office/powerpoint/2010/main" val="4068224205"/>
       </p:ext>
     </p:extLst>
   </p:cSld>
@@ -1087,7 +1176,7 @@
     </p:spTree>
     <p:extLst>
       <p:ext uri="{BB962C8B-B14F-4D97-AF65-F5344CB8AC3E}">
-        <p14:creationId xmlns:p14="http://schemas.microsoft.com/office/powerpoint/2010/main" val="4068224205"/>
+        <p14:creationId xmlns:p14="http://schemas.microsoft.com/office/powerpoint/2010/main" val="2089262971"/>
       </p:ext>
     </p:extLst>
   </p:cSld>
@@ -1172,7 +1261,7 @@
     </p:spTree>
     <p:extLst>
       <p:ext uri="{BB962C8B-B14F-4D97-AF65-F5344CB8AC3E}">
-        <p14:creationId xmlns:p14="http://schemas.microsoft.com/office/powerpoint/2010/main" val="3379194177"/>
+        <p14:creationId xmlns:p14="http://schemas.microsoft.com/office/powerpoint/2010/main" val="3384437068"/>
       </p:ext>
     </p:extLst>
   </p:cSld>
@@ -1257,7 +1346,7 @@
     </p:spTree>
     <p:extLst>
       <p:ext uri="{BB962C8B-B14F-4D97-AF65-F5344CB8AC3E}">
-        <p14:creationId xmlns:p14="http://schemas.microsoft.com/office/powerpoint/2010/main" val="2089262971"/>
+        <p14:creationId xmlns:p14="http://schemas.microsoft.com/office/powerpoint/2010/main" val="875769614"/>
       </p:ext>
     </p:extLst>
   </p:cSld>
@@ -1342,7 +1431,7 @@
     </p:spTree>
     <p:extLst>
       <p:ext uri="{BB962C8B-B14F-4D97-AF65-F5344CB8AC3E}">
-        <p14:creationId xmlns:p14="http://schemas.microsoft.com/office/powerpoint/2010/main" val="904019331"/>
+        <p14:creationId xmlns:p14="http://schemas.microsoft.com/office/powerpoint/2010/main" val="741702379"/>
       </p:ext>
     </p:extLst>
   </p:cSld>
@@ -1427,7 +1516,7 @@
     </p:spTree>
     <p:extLst>
       <p:ext uri="{BB962C8B-B14F-4D97-AF65-F5344CB8AC3E}">
-        <p14:creationId xmlns:p14="http://schemas.microsoft.com/office/powerpoint/2010/main" val="271530531"/>
+        <p14:creationId xmlns:p14="http://schemas.microsoft.com/office/powerpoint/2010/main" val="3711989176"/>
       </p:ext>
     </p:extLst>
   </p:cSld>
@@ -1664,7 +1753,7 @@
             <a:fld id="{E4606EA6-EFEA-4C30-9264-4F9291A5780D}" type="datetime1">
               <a:rPr lang="pt-PT" smtClean="0"/>
               <a:pPr/>
-              <a:t>17/01/2017</a:t>
+              <a:t>23/01/2017</a:t>
             </a:fld>
             <a:endParaRPr kumimoji="0" lang="pt-PT" sz="1400">
               <a:solidFill>
@@ -1892,7 +1981,7 @@
             <a:fld id="{E4606EA6-EFEA-4C30-9264-4F9291A5780D}" type="datetime1">
               <a:rPr lang="pt-PT" smtClean="0"/>
               <a:pPr/>
-              <a:t>17/01/2017</a:t>
+              <a:t>23/01/2017</a:t>
             </a:fld>
             <a:endParaRPr kumimoji="0" lang="pt-PT" sz="1400">
               <a:solidFill>
@@ -2168,7 +2257,7 @@
             <a:fld id="{E4606EA6-EFEA-4C30-9264-4F9291A5780D}" type="datetime1">
               <a:rPr lang="pt-PT" smtClean="0"/>
               <a:pPr/>
-              <a:t>17/01/2017</a:t>
+              <a:t>23/01/2017</a:t>
             </a:fld>
             <a:endParaRPr kumimoji="0" lang="pt-PT" sz="1400">
               <a:solidFill>
@@ -2362,7 +2451,7 @@
             <a:fld id="{E4606EA6-EFEA-4C30-9264-4F9291A5780D}" type="datetime1">
               <a:rPr lang="pt-PT" smtClean="0"/>
               <a:pPr/>
-              <a:t>17/01/2017</a:t>
+              <a:t>23/01/2017</a:t>
             </a:fld>
             <a:endParaRPr kumimoji="0" lang="pt-PT" sz="1400">
               <a:solidFill>
@@ -2717,7 +2806,7 @@
             <a:fld id="{6FCF9F07-3BC7-4570-B054-79111B0A380C}" type="datetime1">
               <a:rPr lang="pt-PT" smtClean="0"/>
               <a:pPr/>
-              <a:t>17/01/2017</a:t>
+              <a:t>23/01/2017</a:t>
             </a:fld>
             <a:endParaRPr kumimoji="0" lang="pt-PT"/>
           </a:p>
@@ -3003,7 +3092,7 @@
             <a:fld id="{E4606EA6-EFEA-4C30-9264-4F9291A5780D}" type="datetime1">
               <a:rPr lang="pt-PT" smtClean="0"/>
               <a:pPr/>
-              <a:t>17/01/2017</a:t>
+              <a:t>23/01/2017</a:t>
             </a:fld>
             <a:endParaRPr kumimoji="0" lang="pt-PT"/>
           </a:p>
@@ -3389,7 +3478,7 @@
             <a:fld id="{E4606EA6-EFEA-4C30-9264-4F9291A5780D}" type="datetime1">
               <a:rPr lang="pt-PT" smtClean="0"/>
               <a:pPr/>
-              <a:t>17/01/2017</a:t>
+              <a:t>23/01/2017</a:t>
             </a:fld>
             <a:endParaRPr kumimoji="0" lang="pt-PT"/>
           </a:p>
@@ -3514,7 +3603,7 @@
             <a:fld id="{E4606EA6-EFEA-4C30-9264-4F9291A5780D}" type="datetime1">
               <a:rPr lang="pt-PT" smtClean="0"/>
               <a:pPr/>
-              <a:t>17/01/2017</a:t>
+              <a:t>23/01/2017</a:t>
             </a:fld>
             <a:endParaRPr kumimoji="0" lang="pt-PT" sz="1400">
               <a:solidFill>
@@ -3705,7 +3794,7 @@
             <a:fld id="{E4606EA6-EFEA-4C30-9264-4F9291A5780D}" type="datetime1">
               <a:rPr lang="pt-PT" smtClean="0"/>
               <a:pPr/>
-              <a:t>17/01/2017</a:t>
+              <a:t>23/01/2017</a:t>
             </a:fld>
             <a:endParaRPr kumimoji="0" lang="pt-PT" sz="1400">
               <a:solidFill>
@@ -4079,7 +4168,7 @@
             <a:fld id="{F49A8198-4617-485E-9585-4840B69DBBA6}" type="datetime1">
               <a:rPr lang="pt-PT" smtClean="0"/>
               <a:pPr/>
-              <a:t>17/01/2017</a:t>
+              <a:t>23/01/2017</a:t>
             </a:fld>
             <a:endParaRPr kumimoji="0" lang="pt-PT"/>
           </a:p>
@@ -4471,7 +4560,7 @@
             <a:fld id="{E4606EA6-EFEA-4C30-9264-4F9291A5780D}" type="datetime1">
               <a:rPr lang="pt-PT" smtClean="0"/>
               <a:pPr/>
-              <a:t>17/01/2017</a:t>
+              <a:t>23/01/2017</a:t>
             </a:fld>
             <a:endParaRPr kumimoji="0" lang="pt-PT"/>
           </a:p>
@@ -4770,7 +4859,7 @@
             <a:fld id="{E4606EA6-EFEA-4C30-9264-4F9291A5780D}" type="datetime1">
               <a:rPr lang="pt-PT" smtClean="0"/>
               <a:pPr/>
-              <a:t>17/01/2017</a:t>
+              <a:t>23/01/2017</a:t>
             </a:fld>
             <a:endParaRPr kumimoji="0" lang="pt-PT" sz="1400">
               <a:solidFill>
@@ -5378,7 +5467,7 @@
                 <a:latin typeface="MS UI Gothic" panose="020B0600070205080204" pitchFamily="34" charset="-128"/>
                 <a:ea typeface="MS UI Gothic" panose="020B0600070205080204" pitchFamily="34" charset="-128"/>
               </a:rPr>
-              <a:t>Carlos Pereira, João Barreira, Tiago Bouças e Tiago Duarte (grupo 29) Bases de Dados – MIEI – Universidade do Minho</a:t>
+              <a:t>Carlos Pereira, João Barreira, Tiago Bouças e Tiago Duarte (Grupo 29) Bases de Dados – MIEI – Universidade do Minho</a:t>
             </a:r>
           </a:p>
         </p:txBody>
@@ -5475,12 +5564,8 @@
                 <a:latin typeface="MS UI Gothic" panose="020B0600070205080204" pitchFamily="34" charset="-128"/>
                 <a:ea typeface="MS UI Gothic" panose="020B0600070205080204" pitchFamily="34" charset="-128"/>
               </a:rPr>
-              <a:t>Construção do Modelo Físico</a:t>
-            </a:r>
-            <a:endParaRPr lang="pt-PT" b="1" dirty="0">
-              <a:latin typeface="MS UI Gothic" panose="020B0600070205080204" pitchFamily="34" charset="-128"/>
-              <a:ea typeface="MS UI Gothic" panose="020B0600070205080204" pitchFamily="34" charset="-128"/>
-            </a:endParaRPr>
+              <a:t>Vista - Viagens</a:t>
+            </a:r>
           </a:p>
         </p:txBody>
       </p:sp>
@@ -5511,7 +5596,21 @@
                 <a:latin typeface="MS UI Gothic" panose="020B0600070205080204" pitchFamily="34" charset="-128"/>
                 <a:ea typeface="MS UI Gothic" panose="020B0600070205080204" pitchFamily="34" charset="-128"/>
               </a:rPr>
-              <a:t>Carlos Pereira, João Barreira, Tiago Bouças e Tiago Duarte</a:t>
+              <a:t>Carlos Pereira, João Barreira, </a:t>
+            </a:r>
+            <a:r>
+              <a:rPr lang="pt-PT" sz="1400" b="1" u="sng" dirty="0">
+                <a:latin typeface="MS UI Gothic" panose="020B0600070205080204" pitchFamily="34" charset="-128"/>
+                <a:ea typeface="MS UI Gothic" panose="020B0600070205080204" pitchFamily="34" charset="-128"/>
+              </a:rPr>
+              <a:t>Tiago Bouças</a:t>
+            </a:r>
+            <a:r>
+              <a:rPr lang="pt-PT" sz="1400" dirty="0">
+                <a:latin typeface="MS UI Gothic" panose="020B0600070205080204" pitchFamily="34" charset="-128"/>
+                <a:ea typeface="MS UI Gothic" panose="020B0600070205080204" pitchFamily="34" charset="-128"/>
+              </a:rPr>
+              <a:t> e Tiago Duarte</a:t>
             </a:r>
           </a:p>
         </p:txBody>
@@ -5578,352 +5677,274 @@
           </a:prstGeom>
         </p:spPr>
       </p:pic>
-      <p:sp>
-        <p:nvSpPr>
-          <p:cNvPr id="9" name="Marcador de Posição de Conteúdo 2"/>
-          <p:cNvSpPr txBox="1">
-            <a:spLocks/>
-          </p:cNvSpPr>
+      <p:pic>
+        <p:nvPicPr>
+          <p:cNvPr id="11" name="Imagem 10"/>
+          <p:cNvPicPr>
+            <a:picLocks noChangeAspect="1"/>
+          </p:cNvPicPr>
           <p:nvPr/>
-        </p:nvSpPr>
-        <p:spPr>
-          <a:xfrm>
-            <a:off x="822960" y="1779662"/>
-            <a:ext cx="7543800" cy="3017520"/>
+        </p:nvPicPr>
+        <p:blipFill>
+          <a:blip r:embed="rId4">
+            <a:extLst>
+              <a:ext uri="{28A0092B-C50C-407E-A947-70E740481C1C}">
+                <a14:useLocalDpi xmlns:a14="http://schemas.microsoft.com/office/drawing/2010/main" val="0"/>
+              </a:ext>
+            </a:extLst>
+          </a:blip>
+          <a:stretch>
+            <a:fillRect/>
+          </a:stretch>
+        </p:blipFill>
+        <p:spPr>
+          <a:xfrm>
+            <a:off x="2672221" y="2859782"/>
+            <a:ext cx="4163006" cy="1667108"/>
           </a:xfrm>
           <a:prstGeom prst="rect">
             <a:avLst/>
           </a:prstGeom>
         </p:spPr>
-        <p:txBody>
-          <a:bodyPr vert="horz" lIns="0" tIns="45720" rIns="0" bIns="45720" rtlCol="0">
-            <a:normAutofit/>
-          </a:bodyPr>
-          <a:lstStyle>
-            <a:lvl1pPr marL="68580" indent="-68580" algn="l" defTabSz="685800" rtl="0" eaLnBrk="1" latinLnBrk="0" hangingPunct="1">
-              <a:lnSpc>
-                <a:spcPct val="90000"/>
-              </a:lnSpc>
-              <a:spcBef>
-                <a:spcPts val="900"/>
-              </a:spcBef>
-              <a:spcAft>
-                <a:spcPts val="150"/>
-              </a:spcAft>
-              <a:buClr>
-                <a:schemeClr val="accent1"/>
-              </a:buClr>
-              <a:buSzPct val="100000"/>
-              <a:buFont typeface="Calibri" panose="020F0502020204030204" pitchFamily="34" charset="0"/>
-              <a:buChar char=" "/>
-              <a:defRPr sz="1500" kern="1200">
-                <a:solidFill>
-                  <a:schemeClr val="tx1">
-                    <a:lumMod val="75000"/>
-                    <a:lumOff val="25000"/>
-                  </a:schemeClr>
-                </a:solidFill>
-                <a:latin typeface="+mn-lt"/>
-                <a:ea typeface="+mn-ea"/>
-                <a:cs typeface="+mn-cs"/>
-              </a:defRPr>
-            </a:lvl1pPr>
-            <a:lvl2pPr marL="288036" indent="-137160" algn="l" defTabSz="685800" rtl="0" eaLnBrk="1" latinLnBrk="0" hangingPunct="1">
-              <a:lnSpc>
-                <a:spcPct val="90000"/>
-              </a:lnSpc>
-              <a:spcBef>
-                <a:spcPts val="150"/>
-              </a:spcBef>
-              <a:spcAft>
-                <a:spcPts val="300"/>
-              </a:spcAft>
-              <a:buClr>
-                <a:schemeClr val="accent1"/>
-              </a:buClr>
-              <a:buFont typeface="Calibri" pitchFamily="34" charset="0"/>
-              <a:buChar char="◦"/>
-              <a:defRPr sz="1350" kern="1200">
-                <a:solidFill>
-                  <a:schemeClr val="tx1">
-                    <a:lumMod val="75000"/>
-                    <a:lumOff val="25000"/>
-                  </a:schemeClr>
-                </a:solidFill>
-                <a:latin typeface="+mn-lt"/>
-                <a:ea typeface="+mn-ea"/>
-                <a:cs typeface="+mn-cs"/>
-              </a:defRPr>
-            </a:lvl2pPr>
-            <a:lvl3pPr marL="425196" indent="-137160" algn="l" defTabSz="685800" rtl="0" eaLnBrk="1" latinLnBrk="0" hangingPunct="1">
-              <a:lnSpc>
-                <a:spcPct val="90000"/>
-              </a:lnSpc>
-              <a:spcBef>
-                <a:spcPts val="150"/>
-              </a:spcBef>
-              <a:spcAft>
-                <a:spcPts val="300"/>
-              </a:spcAft>
-              <a:buClr>
-                <a:schemeClr val="accent1"/>
-              </a:buClr>
-              <a:buFont typeface="Calibri" pitchFamily="34" charset="0"/>
-              <a:buChar char="◦"/>
-              <a:defRPr sz="1050" kern="1200">
-                <a:solidFill>
-                  <a:schemeClr val="tx1">
-                    <a:lumMod val="75000"/>
-                    <a:lumOff val="25000"/>
-                  </a:schemeClr>
-                </a:solidFill>
-                <a:latin typeface="+mn-lt"/>
-                <a:ea typeface="+mn-ea"/>
-                <a:cs typeface="+mn-cs"/>
-              </a:defRPr>
-            </a:lvl3pPr>
-            <a:lvl4pPr marL="562356" indent="-137160" algn="l" defTabSz="685800" rtl="0" eaLnBrk="1" latinLnBrk="0" hangingPunct="1">
-              <a:lnSpc>
-                <a:spcPct val="90000"/>
-              </a:lnSpc>
-              <a:spcBef>
-                <a:spcPts val="150"/>
-              </a:spcBef>
-              <a:spcAft>
-                <a:spcPts val="300"/>
-              </a:spcAft>
-              <a:buClr>
-                <a:schemeClr val="accent1"/>
-              </a:buClr>
-              <a:buFont typeface="Calibri" pitchFamily="34" charset="0"/>
-              <a:buChar char="◦"/>
-              <a:defRPr sz="1050" kern="1200">
-                <a:solidFill>
-                  <a:schemeClr val="tx1">
-                    <a:lumMod val="75000"/>
-                    <a:lumOff val="25000"/>
-                  </a:schemeClr>
-                </a:solidFill>
-                <a:latin typeface="+mn-lt"/>
-                <a:ea typeface="+mn-ea"/>
-                <a:cs typeface="+mn-cs"/>
-              </a:defRPr>
-            </a:lvl4pPr>
-            <a:lvl5pPr marL="699516" indent="-137160" algn="l" defTabSz="685800" rtl="0" eaLnBrk="1" latinLnBrk="0" hangingPunct="1">
-              <a:lnSpc>
-                <a:spcPct val="90000"/>
-              </a:lnSpc>
-              <a:spcBef>
-                <a:spcPts val="150"/>
-              </a:spcBef>
-              <a:spcAft>
-                <a:spcPts val="300"/>
-              </a:spcAft>
-              <a:buClr>
-                <a:schemeClr val="accent1"/>
-              </a:buClr>
-              <a:buFont typeface="Calibri" pitchFamily="34" charset="0"/>
-              <a:buChar char="◦"/>
-              <a:defRPr sz="1050" kern="1200">
-                <a:solidFill>
-                  <a:schemeClr val="tx1">
-                    <a:lumMod val="75000"/>
-                    <a:lumOff val="25000"/>
-                  </a:schemeClr>
-                </a:solidFill>
-                <a:latin typeface="+mn-lt"/>
-                <a:ea typeface="+mn-ea"/>
-                <a:cs typeface="+mn-cs"/>
-              </a:defRPr>
-            </a:lvl5pPr>
-            <a:lvl6pPr marL="825000" indent="-171450" algn="l" defTabSz="685800" rtl="0" eaLnBrk="1" latinLnBrk="0" hangingPunct="1">
-              <a:lnSpc>
-                <a:spcPct val="90000"/>
-              </a:lnSpc>
-              <a:spcBef>
-                <a:spcPts val="150"/>
-              </a:spcBef>
-              <a:spcAft>
-                <a:spcPts val="300"/>
-              </a:spcAft>
-              <a:buClr>
-                <a:schemeClr val="accent1"/>
-              </a:buClr>
-              <a:buFont typeface="Calibri" pitchFamily="34" charset="0"/>
-              <a:buChar char="◦"/>
-              <a:defRPr sz="1050" kern="1200">
-                <a:solidFill>
-                  <a:schemeClr val="tx1">
-                    <a:lumMod val="75000"/>
-                    <a:lumOff val="25000"/>
-                  </a:schemeClr>
-                </a:solidFill>
-                <a:latin typeface="+mn-lt"/>
-                <a:ea typeface="+mn-ea"/>
-                <a:cs typeface="+mn-cs"/>
-              </a:defRPr>
-            </a:lvl6pPr>
-            <a:lvl7pPr marL="975000" indent="-171450" algn="l" defTabSz="685800" rtl="0" eaLnBrk="1" latinLnBrk="0" hangingPunct="1">
-              <a:lnSpc>
-                <a:spcPct val="90000"/>
-              </a:lnSpc>
-              <a:spcBef>
-                <a:spcPts val="150"/>
-              </a:spcBef>
-              <a:spcAft>
-                <a:spcPts val="300"/>
-              </a:spcAft>
-              <a:buClr>
-                <a:schemeClr val="accent1"/>
-              </a:buClr>
-              <a:buFont typeface="Calibri" pitchFamily="34" charset="0"/>
-              <a:buChar char="◦"/>
-              <a:defRPr sz="1050" kern="1200">
-                <a:solidFill>
-                  <a:schemeClr val="tx1">
-                    <a:lumMod val="75000"/>
-                    <a:lumOff val="25000"/>
-                  </a:schemeClr>
-                </a:solidFill>
-                <a:latin typeface="+mn-lt"/>
-                <a:ea typeface="+mn-ea"/>
-                <a:cs typeface="+mn-cs"/>
-              </a:defRPr>
-            </a:lvl7pPr>
-            <a:lvl8pPr marL="1125000" indent="-171450" algn="l" defTabSz="685800" rtl="0" eaLnBrk="1" latinLnBrk="0" hangingPunct="1">
-              <a:lnSpc>
-                <a:spcPct val="90000"/>
-              </a:lnSpc>
-              <a:spcBef>
-                <a:spcPts val="150"/>
-              </a:spcBef>
-              <a:spcAft>
-                <a:spcPts val="300"/>
-              </a:spcAft>
-              <a:buClr>
-                <a:schemeClr val="accent1"/>
-              </a:buClr>
-              <a:buFont typeface="Calibri" pitchFamily="34" charset="0"/>
-              <a:buChar char="◦"/>
-              <a:defRPr sz="1050" kern="1200">
-                <a:solidFill>
-                  <a:schemeClr val="tx1">
-                    <a:lumMod val="75000"/>
-                    <a:lumOff val="25000"/>
-                  </a:schemeClr>
-                </a:solidFill>
-                <a:latin typeface="+mn-lt"/>
-                <a:ea typeface="+mn-ea"/>
-                <a:cs typeface="+mn-cs"/>
-              </a:defRPr>
-            </a:lvl8pPr>
-            <a:lvl9pPr marL="1275000" indent="-171450" algn="l" defTabSz="685800" rtl="0" eaLnBrk="1" latinLnBrk="0" hangingPunct="1">
-              <a:lnSpc>
-                <a:spcPct val="90000"/>
-              </a:lnSpc>
-              <a:spcBef>
-                <a:spcPts val="150"/>
-              </a:spcBef>
-              <a:spcAft>
-                <a:spcPts val="300"/>
-              </a:spcAft>
-              <a:buClr>
-                <a:schemeClr val="accent1"/>
-              </a:buClr>
-              <a:buFont typeface="Calibri" pitchFamily="34" charset="0"/>
-              <a:buChar char="◦"/>
-              <a:defRPr sz="1050" kern="1200">
-                <a:solidFill>
-                  <a:schemeClr val="tx1">
-                    <a:lumMod val="75000"/>
-                    <a:lumOff val="25000"/>
-                  </a:schemeClr>
-                </a:solidFill>
-                <a:latin typeface="+mn-lt"/>
-                <a:ea typeface="+mn-ea"/>
-                <a:cs typeface="+mn-cs"/>
-              </a:defRPr>
-            </a:lvl9pPr>
-          </a:lstStyle>
-          <a:p>
-            <a:pPr>
-              <a:buFont typeface="Wingdings" panose="05000000000000000000" pitchFamily="2" charset="2"/>
-              <a:buChar char="Ø"/>
-            </a:pPr>
-            <a:r>
-              <a:rPr lang="pt-PT"/>
-              <a:t>Relações</a:t>
-            </a:r>
-          </a:p>
-          <a:p>
-            <a:pPr>
-              <a:buFont typeface="Wingdings" panose="05000000000000000000" pitchFamily="2" charset="2"/>
-              <a:buChar char="Ø"/>
-            </a:pPr>
-            <a:r>
-              <a:rPr lang="pt-PT"/>
-              <a:t>Representação dos atributos derivados</a:t>
-            </a:r>
-          </a:p>
-          <a:p>
-            <a:pPr>
-              <a:buFont typeface="Wingdings" panose="05000000000000000000" pitchFamily="2" charset="2"/>
-              <a:buChar char="Ø"/>
-            </a:pPr>
-            <a:r>
-              <a:rPr lang="pt-PT"/>
-              <a:t>Restrições gerais</a:t>
-            </a:r>
-          </a:p>
-          <a:p>
-            <a:pPr>
-              <a:buFont typeface="Wingdings" panose="05000000000000000000" pitchFamily="2" charset="2"/>
-              <a:buChar char="Ø"/>
-            </a:pPr>
-            <a:r>
-              <a:rPr lang="pt-PT"/>
-              <a:t>Análise de transações gerais</a:t>
-            </a:r>
-          </a:p>
-          <a:p>
-            <a:pPr>
-              <a:buFont typeface="Wingdings" panose="05000000000000000000" pitchFamily="2" charset="2"/>
-              <a:buChar char="Ø"/>
-            </a:pPr>
-            <a:r>
-              <a:rPr lang="pt-PT"/>
-              <a:t>Escolha dos índices</a:t>
-            </a:r>
-          </a:p>
-          <a:p>
-            <a:pPr>
-              <a:buFont typeface="Wingdings" panose="05000000000000000000" pitchFamily="2" charset="2"/>
-              <a:buChar char="Ø"/>
-            </a:pPr>
-            <a:r>
-              <a:rPr lang="pt-PT"/>
-              <a:t>Vistas</a:t>
-            </a:r>
-          </a:p>
-          <a:p>
-            <a:pPr>
-              <a:buFont typeface="Wingdings" panose="05000000000000000000" pitchFamily="2" charset="2"/>
-              <a:buChar char="Ø"/>
-            </a:pPr>
-            <a:endParaRPr lang="pt-PT" dirty="0"/>
-          </a:p>
-        </p:txBody>
-      </p:sp>
+      </p:pic>
       <p:pic>
         <p:nvPicPr>
-          <p:cNvPr id="10" name="Picture 2" descr="v_cli"/>
+          <p:cNvPr id="12" name="Imagem 11"/>
+          <p:cNvPicPr>
+            <a:picLocks noChangeAspect="1"/>
+          </p:cNvPicPr>
+          <p:nvPr/>
+        </p:nvPicPr>
+        <p:blipFill>
+          <a:blip r:embed="rId5">
+            <a:extLst>
+              <a:ext uri="{28A0092B-C50C-407E-A947-70E740481C1C}">
+                <a14:useLocalDpi xmlns:a14="http://schemas.microsoft.com/office/drawing/2010/main" val="0"/>
+              </a:ext>
+            </a:extLst>
+          </a:blip>
+          <a:stretch>
+            <a:fillRect/>
+          </a:stretch>
+        </p:blipFill>
+        <p:spPr>
+          <a:xfrm>
+            <a:off x="749429" y="1632750"/>
+            <a:ext cx="7783011" cy="809738"/>
+          </a:xfrm>
+          <a:prstGeom prst="rect">
+            <a:avLst/>
+          </a:prstGeom>
+        </p:spPr>
+      </p:pic>
+    </p:spTree>
+    <p:extLst>
+      <p:ext uri="{BB962C8B-B14F-4D97-AF65-F5344CB8AC3E}">
+        <p14:creationId xmlns:p14="http://schemas.microsoft.com/office/powerpoint/2010/main" val="1891518605"/>
+      </p:ext>
+    </p:extLst>
+  </p:cSld>
+  <p:clrMapOvr>
+    <a:masterClrMapping/>
+  </p:clrMapOvr>
+</p:sld>
+</file>
+
+<file path=ppt/slides/slide11.xml><?xml version="1.0" encoding="utf-8"?>
+<p:sld xmlns:a="http://schemas.openxmlformats.org/drawingml/2006/main" xmlns:r="http://schemas.openxmlformats.org/officeDocument/2006/relationships" xmlns:p="http://schemas.openxmlformats.org/presentationml/2006/main">
+  <p:cSld>
+    <p:spTree>
+      <p:nvGrpSpPr>
+        <p:cNvPr id="1" name=""/>
+        <p:cNvGrpSpPr/>
+        <p:nvPr/>
+      </p:nvGrpSpPr>
+      <p:grpSpPr>
+        <a:xfrm>
+          <a:off x="0" y="0"/>
+          <a:ext cx="0" cy="0"/>
+          <a:chOff x="0" y="0"/>
+          <a:chExt cx="0" cy="0"/>
+        </a:xfrm>
+      </p:grpSpPr>
+      <p:sp>
+        <p:nvSpPr>
+          <p:cNvPr id="2" name="Título 1"/>
+          <p:cNvSpPr>
+            <a:spLocks noGrp="1"/>
+          </p:cNvSpPr>
+          <p:nvPr>
+            <p:ph type="title"/>
+          </p:nvPr>
+        </p:nvSpPr>
+        <p:spPr>
+          <a:xfrm>
+            <a:off x="827584" y="267494"/>
+            <a:ext cx="7704856" cy="1088068"/>
+          </a:xfrm>
+        </p:spPr>
+        <p:txBody>
+          <a:bodyPr/>
+          <a:lstStyle/>
+          <a:p>
+            <a:pPr algn="ctr"/>
+            <a:r>
+              <a:rPr lang="pt-PT" b="1" dirty="0">
+                <a:latin typeface="MS UI Gothic" panose="020B0600070205080204" pitchFamily="34" charset="-128"/>
+                <a:ea typeface="MS UI Gothic" panose="020B0600070205080204" pitchFamily="34" charset="-128"/>
+              </a:rPr>
+              <a:t>Lugares do Comboio 1</a:t>
+            </a:r>
+          </a:p>
+        </p:txBody>
+      </p:sp>
+      <p:sp>
+        <p:nvSpPr>
+          <p:cNvPr id="4" name="CaixaDeTexto 3"/>
+          <p:cNvSpPr txBox="1"/>
+          <p:nvPr/>
+        </p:nvSpPr>
+        <p:spPr>
+          <a:xfrm>
+            <a:off x="0" y="4786444"/>
+            <a:ext cx="4968552" cy="307777"/>
+          </a:xfrm>
+          <a:prstGeom prst="rect">
+            <a:avLst/>
+          </a:prstGeom>
+          <a:noFill/>
+        </p:spPr>
+        <p:txBody>
+          <a:bodyPr wrap="square" rtlCol="0">
+            <a:spAutoFit/>
+          </a:bodyPr>
+          <a:lstStyle/>
+          <a:p>
+            <a:r>
+              <a:rPr lang="pt-PT" sz="1400" dirty="0">
+                <a:latin typeface="MS UI Gothic" panose="020B0600070205080204" pitchFamily="34" charset="-128"/>
+                <a:ea typeface="MS UI Gothic" panose="020B0600070205080204" pitchFamily="34" charset="-128"/>
+              </a:rPr>
+              <a:t>Carlos Pereira, </a:t>
+            </a:r>
+            <a:r>
+              <a:rPr lang="pt-PT" sz="1400" b="1" u="sng" dirty="0">
+                <a:latin typeface="MS UI Gothic" panose="020B0600070205080204" pitchFamily="34" charset="-128"/>
+                <a:ea typeface="MS UI Gothic" panose="020B0600070205080204" pitchFamily="34" charset="-128"/>
+              </a:rPr>
+              <a:t>João Barreira</a:t>
+            </a:r>
+            <a:r>
+              <a:rPr lang="pt-PT" sz="1400" dirty="0">
+                <a:latin typeface="MS UI Gothic" panose="020B0600070205080204" pitchFamily="34" charset="-128"/>
+                <a:ea typeface="MS UI Gothic" panose="020B0600070205080204" pitchFamily="34" charset="-128"/>
+              </a:rPr>
+              <a:t>, Tiago Bouças e Tiago Duarte</a:t>
+            </a:r>
+          </a:p>
+        </p:txBody>
+      </p:sp>
+      <p:sp>
+        <p:nvSpPr>
+          <p:cNvPr id="6" name="CaixaDeTexto 5"/>
+          <p:cNvSpPr txBox="1"/>
+          <p:nvPr/>
+        </p:nvSpPr>
+        <p:spPr>
+          <a:xfrm>
+            <a:off x="5076056" y="4786443"/>
+            <a:ext cx="4248472" cy="323165"/>
+          </a:xfrm>
+          <a:prstGeom prst="rect">
+            <a:avLst/>
+          </a:prstGeom>
+          <a:noFill/>
+        </p:spPr>
+        <p:txBody>
+          <a:bodyPr wrap="square" rtlCol="0">
+            <a:spAutoFit/>
+          </a:bodyPr>
+          <a:lstStyle/>
+          <a:p>
+            <a:r>
+              <a:rPr lang="pt-PT" sz="1500" dirty="0">
+                <a:latin typeface="MS UI Gothic" panose="020B0600070205080204" pitchFamily="34" charset="-128"/>
+                <a:ea typeface="MS UI Gothic" panose="020B0600070205080204" pitchFamily="34" charset="-128"/>
+              </a:rPr>
+              <a:t>Bases de Dados – MIEI – Universidade do Minho</a:t>
+            </a:r>
+          </a:p>
+        </p:txBody>
+      </p:sp>
+      <p:pic>
+        <p:nvPicPr>
+          <p:cNvPr id="8" name="Imagem 7"/>
+          <p:cNvPicPr>
+            <a:picLocks noChangeAspect="1"/>
+          </p:cNvPicPr>
+          <p:nvPr/>
+        </p:nvPicPr>
+        <p:blipFill>
+          <a:blip r:embed="rId3" cstate="print">
+            <a:extLst>
+              <a:ext uri="{28A0092B-C50C-407E-A947-70E740481C1C}">
+                <a14:useLocalDpi xmlns:a14="http://schemas.microsoft.com/office/drawing/2010/main" val="0"/>
+              </a:ext>
+            </a:extLst>
+          </a:blip>
+          <a:stretch>
+            <a:fillRect/>
+          </a:stretch>
+        </p:blipFill>
+        <p:spPr>
+          <a:xfrm>
+            <a:off x="4753724" y="4811294"/>
+            <a:ext cx="322332" cy="332206"/>
+          </a:xfrm>
+          <a:prstGeom prst="rect">
+            <a:avLst/>
+          </a:prstGeom>
+        </p:spPr>
+      </p:pic>
+      <p:pic>
+        <p:nvPicPr>
+          <p:cNvPr id="3" name="Marcador de Posição de Conteúdo 2"/>
+          <p:cNvPicPr>
+            <a:picLocks noGrp="1" noChangeAspect="1"/>
+          </p:cNvPicPr>
+          <p:nvPr>
+            <p:ph idx="1"/>
+          </p:nvPr>
+        </p:nvPicPr>
+        <p:blipFill>
+          <a:blip r:embed="rId4">
+            <a:extLst>
+              <a:ext uri="{28A0092B-C50C-407E-A947-70E740481C1C}">
+                <a14:useLocalDpi xmlns:a14="http://schemas.microsoft.com/office/drawing/2010/main" val="0"/>
+              </a:ext>
+            </a:extLst>
+          </a:blip>
+          <a:stretch>
+            <a:fillRect/>
+          </a:stretch>
+        </p:blipFill>
+        <p:spPr>
+          <a:xfrm>
+            <a:off x="6012160" y="1995192"/>
+            <a:ext cx="666843" cy="1733792"/>
+          </a:xfrm>
+        </p:spPr>
+      </p:pic>
+      <p:pic>
+        <p:nvPicPr>
+          <p:cNvPr id="5122" name="Picture 2" descr="procedure_lugar"/>
           <p:cNvPicPr>
             <a:picLocks noChangeAspect="1" noChangeArrowheads="1"/>
           </p:cNvPicPr>
           <p:nvPr/>
         </p:nvPicPr>
         <p:blipFill>
-          <a:blip r:embed="rId4">
+          <a:blip r:embed="rId5">
             <a:extLst>
               <a:ext uri="{28A0092B-C50C-407E-A947-70E740481C1C}">
                 <a14:useLocalDpi xmlns:a14="http://schemas.microsoft.com/office/drawing/2010/main" val="0"/>
@@ -5937,8 +5958,8 @@
         </p:blipFill>
         <p:spPr bwMode="auto">
           <a:xfrm>
-            <a:off x="4932040" y="1491630"/>
-            <a:ext cx="3314700" cy="1028700"/>
+            <a:off x="1147471" y="1519063"/>
+            <a:ext cx="4343400" cy="1343025"/>
           </a:xfrm>
           <a:prstGeom prst="rect">
             <a:avLst/>
@@ -5970,7 +5991,242 @@
       </p:pic>
       <p:pic>
         <p:nvPicPr>
-          <p:cNvPr id="11" name="Picture 3" descr="lug_Ocupados"/>
+          <p:cNvPr id="5" name="Imagem 4"/>
+          <p:cNvPicPr>
+            <a:picLocks noChangeAspect="1"/>
+          </p:cNvPicPr>
+          <p:nvPr/>
+        </p:nvPicPr>
+        <p:blipFill>
+          <a:blip r:embed="rId6">
+            <a:extLst>
+              <a:ext uri="{28A0092B-C50C-407E-A947-70E740481C1C}">
+                <a14:useLocalDpi xmlns:a14="http://schemas.microsoft.com/office/drawing/2010/main" val="0"/>
+              </a:ext>
+            </a:extLst>
+          </a:blip>
+          <a:stretch>
+            <a:fillRect/>
+          </a:stretch>
+        </p:blipFill>
+        <p:spPr>
+          <a:xfrm>
+            <a:off x="7200292" y="2537382"/>
+            <a:ext cx="704948" cy="1762371"/>
+          </a:xfrm>
+          <a:prstGeom prst="rect">
+            <a:avLst/>
+          </a:prstGeom>
+        </p:spPr>
+      </p:pic>
+    </p:spTree>
+    <p:extLst>
+      <p:ext uri="{BB962C8B-B14F-4D97-AF65-F5344CB8AC3E}">
+        <p14:creationId xmlns:p14="http://schemas.microsoft.com/office/powerpoint/2010/main" val="3645527443"/>
+      </p:ext>
+    </p:extLst>
+  </p:cSld>
+  <p:clrMapOvr>
+    <a:masterClrMapping/>
+  </p:clrMapOvr>
+</p:sld>
+</file>
+
+<file path=ppt/slides/slide12.xml><?xml version="1.0" encoding="utf-8"?>
+<p:sld xmlns:a="http://schemas.openxmlformats.org/drawingml/2006/main" xmlns:r="http://schemas.openxmlformats.org/officeDocument/2006/relationships" xmlns:p="http://schemas.openxmlformats.org/presentationml/2006/main">
+  <p:cSld>
+    <p:spTree>
+      <p:nvGrpSpPr>
+        <p:cNvPr id="1" name=""/>
+        <p:cNvGrpSpPr/>
+        <p:nvPr/>
+      </p:nvGrpSpPr>
+      <p:grpSpPr>
+        <a:xfrm>
+          <a:off x="0" y="0"/>
+          <a:ext cx="0" cy="0"/>
+          <a:chOff x="0" y="0"/>
+          <a:chExt cx="0" cy="0"/>
+        </a:xfrm>
+      </p:grpSpPr>
+      <p:sp>
+        <p:nvSpPr>
+          <p:cNvPr id="2" name="Título 1"/>
+          <p:cNvSpPr>
+            <a:spLocks noGrp="1"/>
+          </p:cNvSpPr>
+          <p:nvPr>
+            <p:ph type="title"/>
+          </p:nvPr>
+        </p:nvSpPr>
+        <p:spPr>
+          <a:xfrm>
+            <a:off x="827584" y="267494"/>
+            <a:ext cx="7704856" cy="1088068"/>
+          </a:xfrm>
+        </p:spPr>
+        <p:txBody>
+          <a:bodyPr/>
+          <a:lstStyle/>
+          <a:p>
+            <a:pPr algn="ctr"/>
+            <a:r>
+              <a:rPr lang="pt-PT" b="1" i="1" dirty="0" err="1">
+                <a:latin typeface="MS UI Gothic" panose="020B0600070205080204" pitchFamily="34" charset="-128"/>
+                <a:ea typeface="MS UI Gothic" panose="020B0600070205080204" pitchFamily="34" charset="-128"/>
+              </a:rPr>
+              <a:t>Queries</a:t>
+            </a:r>
+            <a:r>
+              <a:rPr lang="pt-PT" b="1" dirty="0">
+                <a:latin typeface="MS UI Gothic" panose="020B0600070205080204" pitchFamily="34" charset="-128"/>
+                <a:ea typeface="MS UI Gothic" panose="020B0600070205080204" pitchFamily="34" charset="-128"/>
+              </a:rPr>
+              <a:t> sobre Lugares</a:t>
+            </a:r>
+          </a:p>
+        </p:txBody>
+      </p:sp>
+      <p:sp>
+        <p:nvSpPr>
+          <p:cNvPr id="4" name="CaixaDeTexto 3"/>
+          <p:cNvSpPr txBox="1"/>
+          <p:nvPr/>
+        </p:nvSpPr>
+        <p:spPr>
+          <a:xfrm>
+            <a:off x="0" y="4786444"/>
+            <a:ext cx="4968552" cy="307777"/>
+          </a:xfrm>
+          <a:prstGeom prst="rect">
+            <a:avLst/>
+          </a:prstGeom>
+          <a:noFill/>
+        </p:spPr>
+        <p:txBody>
+          <a:bodyPr wrap="square" rtlCol="0">
+            <a:spAutoFit/>
+          </a:bodyPr>
+          <a:lstStyle/>
+          <a:p>
+            <a:r>
+              <a:rPr lang="pt-PT" sz="1400" dirty="0">
+                <a:latin typeface="MS UI Gothic" panose="020B0600070205080204" pitchFamily="34" charset="-128"/>
+                <a:ea typeface="MS UI Gothic" panose="020B0600070205080204" pitchFamily="34" charset="-128"/>
+              </a:rPr>
+              <a:t>Carlos Pereira, </a:t>
+            </a:r>
+            <a:r>
+              <a:rPr lang="pt-PT" sz="1400" b="1" u="sng" dirty="0">
+                <a:latin typeface="MS UI Gothic" panose="020B0600070205080204" pitchFamily="34" charset="-128"/>
+                <a:ea typeface="MS UI Gothic" panose="020B0600070205080204" pitchFamily="34" charset="-128"/>
+              </a:rPr>
+              <a:t>João Barreira</a:t>
+            </a:r>
+            <a:r>
+              <a:rPr lang="pt-PT" sz="1400" dirty="0">
+                <a:latin typeface="MS UI Gothic" panose="020B0600070205080204" pitchFamily="34" charset="-128"/>
+                <a:ea typeface="MS UI Gothic" panose="020B0600070205080204" pitchFamily="34" charset="-128"/>
+              </a:rPr>
+              <a:t>, Tiago Bouças e Tiago Duarte</a:t>
+            </a:r>
+          </a:p>
+        </p:txBody>
+      </p:sp>
+      <p:sp>
+        <p:nvSpPr>
+          <p:cNvPr id="6" name="CaixaDeTexto 5"/>
+          <p:cNvSpPr txBox="1"/>
+          <p:nvPr/>
+        </p:nvSpPr>
+        <p:spPr>
+          <a:xfrm>
+            <a:off x="5076056" y="4786443"/>
+            <a:ext cx="4248472" cy="323165"/>
+          </a:xfrm>
+          <a:prstGeom prst="rect">
+            <a:avLst/>
+          </a:prstGeom>
+          <a:noFill/>
+        </p:spPr>
+        <p:txBody>
+          <a:bodyPr wrap="square" rtlCol="0">
+            <a:spAutoFit/>
+          </a:bodyPr>
+          <a:lstStyle/>
+          <a:p>
+            <a:r>
+              <a:rPr lang="pt-PT" sz="1500" dirty="0">
+                <a:latin typeface="MS UI Gothic" panose="020B0600070205080204" pitchFamily="34" charset="-128"/>
+                <a:ea typeface="MS UI Gothic" panose="020B0600070205080204" pitchFamily="34" charset="-128"/>
+              </a:rPr>
+              <a:t>Bases de Dados – MIEI – Universidade do Minho</a:t>
+            </a:r>
+          </a:p>
+        </p:txBody>
+      </p:sp>
+      <p:pic>
+        <p:nvPicPr>
+          <p:cNvPr id="8" name="Imagem 7"/>
+          <p:cNvPicPr>
+            <a:picLocks noChangeAspect="1"/>
+          </p:cNvPicPr>
+          <p:nvPr/>
+        </p:nvPicPr>
+        <p:blipFill>
+          <a:blip r:embed="rId3" cstate="print">
+            <a:extLst>
+              <a:ext uri="{28A0092B-C50C-407E-A947-70E740481C1C}">
+                <a14:useLocalDpi xmlns:a14="http://schemas.microsoft.com/office/drawing/2010/main" val="0"/>
+              </a:ext>
+            </a:extLst>
+          </a:blip>
+          <a:stretch>
+            <a:fillRect/>
+          </a:stretch>
+        </p:blipFill>
+        <p:spPr>
+          <a:xfrm>
+            <a:off x="4753724" y="4811294"/>
+            <a:ext cx="322332" cy="332206"/>
+          </a:xfrm>
+          <a:prstGeom prst="rect">
+            <a:avLst/>
+          </a:prstGeom>
+        </p:spPr>
+      </p:pic>
+      <p:pic>
+        <p:nvPicPr>
+          <p:cNvPr id="9" name="Marcador de Posição de Conteúdo 8"/>
+          <p:cNvPicPr>
+            <a:picLocks noGrp="1" noChangeAspect="1"/>
+          </p:cNvPicPr>
+          <p:nvPr>
+            <p:ph idx="1"/>
+          </p:nvPr>
+        </p:nvPicPr>
+        <p:blipFill>
+          <a:blip r:embed="rId4">
+            <a:extLst>
+              <a:ext uri="{28A0092B-C50C-407E-A947-70E740481C1C}">
+                <a14:useLocalDpi xmlns:a14="http://schemas.microsoft.com/office/drawing/2010/main" val="0"/>
+              </a:ext>
+            </a:extLst>
+          </a:blip>
+          <a:stretch>
+            <a:fillRect/>
+          </a:stretch>
+        </p:blipFill>
+        <p:spPr>
+          <a:xfrm>
+            <a:off x="6363402" y="3128683"/>
+            <a:ext cx="666843" cy="1505160"/>
+          </a:xfrm>
+        </p:spPr>
+      </p:pic>
+      <p:pic>
+        <p:nvPicPr>
+          <p:cNvPr id="4098" name="Picture 2" descr="lug_Ocupados"/>
           <p:cNvPicPr>
             <a:picLocks noChangeAspect="1" noChangeArrowheads="1"/>
           </p:cNvPicPr>
@@ -5991,7 +6247,7 @@
         </p:blipFill>
         <p:spPr bwMode="auto">
           <a:xfrm>
-            <a:off x="3707904" y="2925331"/>
+            <a:off x="4753724" y="1509234"/>
             <a:ext cx="3886200" cy="1466850"/>
           </a:xfrm>
           <a:prstGeom prst="rect">
@@ -6022,10 +6278,94 @@
           </a:extLst>
         </p:spPr>
       </p:pic>
+      <p:pic>
+        <p:nvPicPr>
+          <p:cNvPr id="12" name="Picture 2" descr="Lugares_Ocupados"/>
+          <p:cNvPicPr>
+            <a:picLocks noChangeAspect="1" noChangeArrowheads="1"/>
+          </p:cNvPicPr>
+          <p:nvPr/>
+        </p:nvPicPr>
+        <p:blipFill>
+          <a:blip r:embed="rId6">
+            <a:extLst>
+              <a:ext uri="{28A0092B-C50C-407E-A947-70E740481C1C}">
+                <a14:useLocalDpi xmlns:a14="http://schemas.microsoft.com/office/drawing/2010/main" val="0"/>
+              </a:ext>
+            </a:extLst>
+          </a:blip>
+          <a:srcRect/>
+          <a:stretch>
+            <a:fillRect/>
+          </a:stretch>
+        </p:blipFill>
+        <p:spPr bwMode="auto">
+          <a:xfrm>
+            <a:off x="486013" y="1457969"/>
+            <a:ext cx="3996525" cy="1518115"/>
+          </a:xfrm>
+          <a:prstGeom prst="rect">
+            <a:avLst/>
+          </a:prstGeom>
+          <a:noFill/>
+          <a:ln>
+            <a:noFill/>
+          </a:ln>
+          <a:extLst>
+            <a:ext uri="{909E8E84-426E-40DD-AFC4-6F175D3DCCD1}">
+              <a14:hiddenFill xmlns:a14="http://schemas.microsoft.com/office/drawing/2010/main">
+                <a:solidFill>
+                  <a:srgbClr val="FFFFFF"/>
+                </a:solidFill>
+              </a14:hiddenFill>
+            </a:ext>
+            <a:ext uri="{91240B29-F687-4F45-9708-019B960494DF}">
+              <a14:hiddenLine xmlns:a14="http://schemas.microsoft.com/office/drawing/2010/main" w="9525">
+                <a:solidFill>
+                  <a:srgbClr val="000000"/>
+                </a:solidFill>
+                <a:miter lim="800000"/>
+                <a:headEnd/>
+                <a:tailEnd/>
+              </a14:hiddenLine>
+            </a:ext>
+          </a:extLst>
+        </p:spPr>
+      </p:pic>
+      <p:pic>
+        <p:nvPicPr>
+          <p:cNvPr id="13" name="Marcador de Posição de Conteúdo 6"/>
+          <p:cNvPicPr>
+            <a:picLocks noChangeAspect="1"/>
+          </p:cNvPicPr>
+          <p:nvPr/>
+        </p:nvPicPr>
+        <p:blipFill>
+          <a:blip r:embed="rId7">
+            <a:extLst>
+              <a:ext uri="{28A0092B-C50C-407E-A947-70E740481C1C}">
+                <a14:useLocalDpi xmlns:a14="http://schemas.microsoft.com/office/drawing/2010/main" val="0"/>
+              </a:ext>
+            </a:extLst>
+          </a:blip>
+          <a:stretch>
+            <a:fillRect/>
+          </a:stretch>
+        </p:blipFill>
+        <p:spPr>
+          <a:xfrm>
+            <a:off x="1979712" y="2909577"/>
+            <a:ext cx="781159" cy="1724266"/>
+          </a:xfrm>
+          <a:prstGeom prst="rect">
+            <a:avLst/>
+          </a:prstGeom>
+        </p:spPr>
+      </p:pic>
     </p:spTree>
     <p:extLst>
       <p:ext uri="{BB962C8B-B14F-4D97-AF65-F5344CB8AC3E}">
-        <p14:creationId xmlns:p14="http://schemas.microsoft.com/office/powerpoint/2010/main" val="3712138822"/>
+        <p14:creationId xmlns:p14="http://schemas.microsoft.com/office/powerpoint/2010/main" val="4105102851"/>
       </p:ext>
     </p:extLst>
   </p:cSld>
@@ -6035,7 +6375,7 @@
 </p:sld>
 </file>
 
-<file path=ppt/slides/slide11.xml><?xml version="1.0" encoding="utf-8"?>
+<file path=ppt/slides/slide13.xml><?xml version="1.0" encoding="utf-8"?>
 <p:sld xmlns:a="http://schemas.openxmlformats.org/drawingml/2006/main" xmlns:r="http://schemas.openxmlformats.org/officeDocument/2006/relationships" xmlns:p="http://schemas.openxmlformats.org/presentationml/2006/main">
   <p:cSld>
     <p:spTree>
@@ -6078,7 +6418,42 @@
                 <a:latin typeface="MS UI Gothic" panose="020B0600070205080204" pitchFamily="34" charset="-128"/>
                 <a:ea typeface="MS UI Gothic" panose="020B0600070205080204" pitchFamily="34" charset="-128"/>
               </a:rPr>
-              <a:t>Transação – Adicionar Bilhete</a:t>
+              <a:t>Parte 2 – </a:t>
+            </a:r>
+            <a:r>
+              <a:rPr lang="pt-PT" b="1" i="1" dirty="0" err="1">
+                <a:latin typeface="MS UI Gothic" panose="020B0600070205080204" pitchFamily="34" charset="-128"/>
+                <a:ea typeface="MS UI Gothic" panose="020B0600070205080204" pitchFamily="34" charset="-128"/>
+              </a:rPr>
+              <a:t>NoSQL</a:t>
+            </a:r>
+            <a:r>
+              <a:rPr lang="pt-PT" b="1" i="1" dirty="0">
+                <a:latin typeface="MS UI Gothic" panose="020B0600070205080204" pitchFamily="34" charset="-128"/>
+                <a:ea typeface="MS UI Gothic" panose="020B0600070205080204" pitchFamily="34" charset="-128"/>
+              </a:rPr>
+              <a:t> </a:t>
+            </a:r>
+            <a:r>
+              <a:rPr lang="pt-PT" b="1" dirty="0">
+                <a:latin typeface="MS UI Gothic" panose="020B0600070205080204" pitchFamily="34" charset="-128"/>
+                <a:ea typeface="MS UI Gothic" panose="020B0600070205080204" pitchFamily="34" charset="-128"/>
+              </a:rPr>
+              <a:t>(</a:t>
+            </a:r>
+            <a:r>
+              <a:rPr lang="pt-PT" b="1" i="1" dirty="0" err="1">
+                <a:latin typeface="MS UI Gothic" panose="020B0600070205080204" pitchFamily="34" charset="-128"/>
+                <a:ea typeface="MS UI Gothic" panose="020B0600070205080204" pitchFamily="34" charset="-128"/>
+              </a:rPr>
+              <a:t>MongoDB</a:t>
+            </a:r>
+            <a:r>
+              <a:rPr lang="pt-PT" b="1" dirty="0">
+                <a:latin typeface="MS UI Gothic" panose="020B0600070205080204" pitchFamily="34" charset="-128"/>
+                <a:ea typeface="MS UI Gothic" panose="020B0600070205080204" pitchFamily="34" charset="-128"/>
+              </a:rPr>
+              <a:t>)</a:t>
             </a:r>
           </a:p>
         </p:txBody>
@@ -6110,7 +6485,21 @@
                 <a:latin typeface="MS UI Gothic" panose="020B0600070205080204" pitchFamily="34" charset="-128"/>
                 <a:ea typeface="MS UI Gothic" panose="020B0600070205080204" pitchFamily="34" charset="-128"/>
               </a:rPr>
-              <a:t>Carlos Pereira, João Barreira, Tiago Bouças e Tiago Duarte</a:t>
+              <a:t>Carlos Pereira, João Barreira, </a:t>
+            </a:r>
+            <a:r>
+              <a:rPr lang="pt-PT" sz="1400" b="1" u="sng" dirty="0">
+                <a:latin typeface="MS UI Gothic" panose="020B0600070205080204" pitchFamily="34" charset="-128"/>
+                <a:ea typeface="MS UI Gothic" panose="020B0600070205080204" pitchFamily="34" charset="-128"/>
+              </a:rPr>
+              <a:t>Tiago Bouças</a:t>
+            </a:r>
+            <a:r>
+              <a:rPr lang="pt-PT" sz="1400" dirty="0">
+                <a:latin typeface="MS UI Gothic" panose="020B0600070205080204" pitchFamily="34" charset="-128"/>
+                <a:ea typeface="MS UI Gothic" panose="020B0600070205080204" pitchFamily="34" charset="-128"/>
+              </a:rPr>
+              <a:t> e Tiago Duarte</a:t>
             </a:r>
           </a:p>
         </p:txBody>
@@ -6123,7 +6512,7 @@
         </p:nvSpPr>
         <p:spPr>
           <a:xfrm>
-            <a:off x="5076056" y="4786443"/>
+            <a:off x="5076056" y="4797075"/>
             <a:ext cx="4248472" cy="323165"/>
           </a:xfrm>
           <a:prstGeom prst="rect">
@@ -6179,13 +6568,11 @@
       </p:pic>
       <p:pic>
         <p:nvPicPr>
-          <p:cNvPr id="12" name="Marcador de Posição de Conteúdo 3"/>
+          <p:cNvPr id="1027" name="Picture 3" descr="p1"/>
           <p:cNvPicPr>
-            <a:picLocks noGrp="1" noChangeAspect="1"/>
+            <a:picLocks noChangeAspect="1" noChangeArrowheads="1"/>
           </p:cNvPicPr>
-          <p:nvPr>
-            <p:ph idx="1"/>
-          </p:nvPr>
+          <p:nvPr/>
         </p:nvPicPr>
         <p:blipFill>
           <a:blip r:embed="rId4">
@@ -6195,26 +6582,53 @@
               </a:ext>
             </a:extLst>
           </a:blip>
+          <a:srcRect/>
           <a:stretch>
             <a:fillRect/>
           </a:stretch>
         </p:blipFill>
-        <p:spPr>
-          <a:xfrm>
-            <a:off x="323528" y="1603002"/>
-            <a:ext cx="4113698" cy="3017838"/>
-          </a:xfrm>
+        <p:spPr bwMode="auto">
+          <a:xfrm>
+            <a:off x="1187624" y="1399542"/>
+            <a:ext cx="2983061" cy="3239047"/>
+          </a:xfrm>
+          <a:prstGeom prst="rect">
+            <a:avLst/>
+          </a:prstGeom>
+          <a:noFill/>
+          <a:ln>
+            <a:noFill/>
+          </a:ln>
+          <a:extLst>
+            <a:ext uri="{909E8E84-426E-40DD-AFC4-6F175D3DCCD1}">
+              <a14:hiddenFill xmlns:a14="http://schemas.microsoft.com/office/drawing/2010/main">
+                <a:solidFill>
+                  <a:srgbClr val="FFFFFF"/>
+                </a:solidFill>
+              </a14:hiddenFill>
+            </a:ext>
+            <a:ext uri="{91240B29-F687-4F45-9708-019B960494DF}">
+              <a14:hiddenLine xmlns:a14="http://schemas.microsoft.com/office/drawing/2010/main" w="9525">
+                <a:solidFill>
+                  <a:srgbClr val="000000"/>
+                </a:solidFill>
+                <a:miter lim="800000"/>
+                <a:headEnd/>
+                <a:tailEnd/>
+              </a14:hiddenLine>
+            </a:ext>
+          </a:extLst>
         </p:spPr>
       </p:pic>
       <p:pic>
         <p:nvPicPr>
-          <p:cNvPr id="13" name="Imagem 12"/>
+          <p:cNvPr id="1029" name="Picture 5" descr="Capturar"/>
           <p:cNvPicPr>
-            <a:picLocks noChangeAspect="1"/>
+            <a:picLocks noChangeAspect="1" noChangeArrowheads="1"/>
           </p:cNvPicPr>
           <p:nvPr/>
         </p:nvPicPr>
-        <p:blipFill>
+        <p:blipFill rotWithShape="1">
           <a:blip r:embed="rId5">
             <a:extLst>
               <a:ext uri="{28A0092B-C50C-407E-A947-70E740481C1C}">
@@ -6222,24 +6636,46 @@
               </a:ext>
             </a:extLst>
           </a:blip>
-          <a:stretch>
-            <a:fillRect/>
-          </a:stretch>
+          <a:srcRect t="-1" b="37254"/>
+          <a:stretch/>
         </p:blipFill>
-        <p:spPr>
-          <a:xfrm>
-            <a:off x="4666191" y="1603002"/>
-            <a:ext cx="4145749" cy="3134162"/>
+        <p:spPr bwMode="auto">
+          <a:xfrm>
+            <a:off x="4763920" y="1419623"/>
+            <a:ext cx="2886501" cy="3218966"/>
           </a:xfrm>
           <a:prstGeom prst="rect">
             <a:avLst/>
           </a:prstGeom>
+          <a:noFill/>
+          <a:ln>
+            <a:noFill/>
+          </a:ln>
+          <a:extLst>
+            <a:ext uri="{909E8E84-426E-40DD-AFC4-6F175D3DCCD1}">
+              <a14:hiddenFill xmlns:a14="http://schemas.microsoft.com/office/drawing/2010/main">
+                <a:solidFill>
+                  <a:srgbClr val="FFFFFF"/>
+                </a:solidFill>
+              </a14:hiddenFill>
+            </a:ext>
+            <a:ext uri="{91240B29-F687-4F45-9708-019B960494DF}">
+              <a14:hiddenLine xmlns:a14="http://schemas.microsoft.com/office/drawing/2010/main" w="9525">
+                <a:solidFill>
+                  <a:srgbClr val="000000"/>
+                </a:solidFill>
+                <a:miter lim="800000"/>
+                <a:headEnd/>
+                <a:tailEnd/>
+              </a14:hiddenLine>
+            </a:ext>
+          </a:extLst>
         </p:spPr>
       </p:pic>
     </p:spTree>
     <p:extLst>
       <p:ext uri="{BB962C8B-B14F-4D97-AF65-F5344CB8AC3E}">
-        <p14:creationId xmlns:p14="http://schemas.microsoft.com/office/powerpoint/2010/main" val="4043336539"/>
+        <p14:creationId xmlns:p14="http://schemas.microsoft.com/office/powerpoint/2010/main" val="1685181694"/>
       </p:ext>
     </p:extLst>
   </p:cSld>
@@ -6249,7 +6685,7 @@
 </p:sld>
 </file>
 
-<file path=ppt/slides/slide12.xml><?xml version="1.0" encoding="utf-8"?>
+<file path=ppt/slides/slide14.xml><?xml version="1.0" encoding="utf-8"?>
 <p:sld xmlns:a="http://schemas.openxmlformats.org/drawingml/2006/main" xmlns:r="http://schemas.openxmlformats.org/officeDocument/2006/relationships" xmlns:p="http://schemas.openxmlformats.org/presentationml/2006/main">
   <p:cSld>
     <p:spTree>
@@ -6276,100 +6712,80 @@
             <p:ph type="title"/>
           </p:nvPr>
         </p:nvSpPr>
-        <p:spPr>
-          <a:xfrm>
-            <a:off x="827584" y="267494"/>
-            <a:ext cx="7704856" cy="1088068"/>
-          </a:xfrm>
-        </p:spPr>
+        <p:spPr/>
         <p:txBody>
           <a:bodyPr/>
           <a:lstStyle/>
           <a:p>
             <a:pPr algn="ctr"/>
             <a:r>
-              <a:rPr lang="pt-PT" b="1" dirty="0" err="1">
-                <a:latin typeface="MS UI Gothic" panose="020B0600070205080204" pitchFamily="34" charset="-128"/>
-                <a:ea typeface="MS UI Gothic" panose="020B0600070205080204" pitchFamily="34" charset="-128"/>
-              </a:rPr>
-              <a:t>MongoDB</a:t>
-            </a:r>
-            <a:endParaRPr lang="pt-PT" b="1" dirty="0">
-              <a:latin typeface="MS UI Gothic" panose="020B0600070205080204" pitchFamily="34" charset="-128"/>
-              <a:ea typeface="MS UI Gothic" panose="020B0600070205080204" pitchFamily="34" charset="-128"/>
-            </a:endParaRPr>
-          </a:p>
-        </p:txBody>
-      </p:sp>
-      <p:sp>
-        <p:nvSpPr>
-          <p:cNvPr id="4" name="CaixaDeTexto 3"/>
-          <p:cNvSpPr txBox="1"/>
+              <a:rPr lang="pt-PT" b="1" i="1" dirty="0"/>
+              <a:t>Script</a:t>
+            </a:r>
+            <a:r>
+              <a:rPr lang="pt-PT" b="1" dirty="0"/>
+              <a:t> de Migração</a:t>
+            </a:r>
+          </a:p>
+        </p:txBody>
+      </p:sp>
+      <p:pic>
+        <p:nvPicPr>
+          <p:cNvPr id="2050" name="Picture 2" descr="16003312_10211806328856522_981337039560739403_n"/>
+          <p:cNvPicPr>
+            <a:picLocks noChangeAspect="1" noChangeArrowheads="1"/>
+          </p:cNvPicPr>
           <p:nvPr/>
-        </p:nvSpPr>
-        <p:spPr>
-          <a:xfrm>
-            <a:off x="0" y="4786444"/>
-            <a:ext cx="4968552" cy="307777"/>
+        </p:nvPicPr>
+        <p:blipFill rotWithShape="1">
+          <a:blip r:embed="rId2">
+            <a:extLst>
+              <a:ext uri="{28A0092B-C50C-407E-A947-70E740481C1C}">
+                <a14:useLocalDpi xmlns:a14="http://schemas.microsoft.com/office/drawing/2010/main" val="0"/>
+              </a:ext>
+            </a:extLst>
+          </a:blip>
+          <a:srcRect t="17719"/>
+          <a:stretch/>
+        </p:blipFill>
+        <p:spPr bwMode="auto">
+          <a:xfrm>
+            <a:off x="5868144" y="1354831"/>
+            <a:ext cx="2952328" cy="3372396"/>
           </a:xfrm>
           <a:prstGeom prst="rect">
             <a:avLst/>
           </a:prstGeom>
           <a:noFill/>
-        </p:spPr>
-        <p:txBody>
-          <a:bodyPr wrap="square" rtlCol="0">
-            <a:spAutoFit/>
-          </a:bodyPr>
-          <a:lstStyle/>
-          <a:p>
-            <a:r>
-              <a:rPr lang="pt-PT" sz="1400" dirty="0">
-                <a:latin typeface="MS UI Gothic" panose="020B0600070205080204" pitchFamily="34" charset="-128"/>
-                <a:ea typeface="MS UI Gothic" panose="020B0600070205080204" pitchFamily="34" charset="-128"/>
-              </a:rPr>
-              <a:t>Carlos Pereira, João Barreira, Tiago Bouças e Tiago Duarte</a:t>
-            </a:r>
-          </a:p>
-        </p:txBody>
-      </p:sp>
-      <p:sp>
-        <p:nvSpPr>
-          <p:cNvPr id="6" name="CaixaDeTexto 5"/>
-          <p:cNvSpPr txBox="1"/>
-          <p:nvPr/>
-        </p:nvSpPr>
-        <p:spPr>
-          <a:xfrm>
-            <a:off x="5076056" y="4786443"/>
-            <a:ext cx="4248472" cy="323165"/>
-          </a:xfrm>
-          <a:prstGeom prst="rect">
-            <a:avLst/>
-          </a:prstGeom>
-          <a:noFill/>
-        </p:spPr>
-        <p:txBody>
-          <a:bodyPr wrap="square" rtlCol="0">
-            <a:spAutoFit/>
-          </a:bodyPr>
-          <a:lstStyle/>
-          <a:p>
-            <a:r>
-              <a:rPr lang="pt-PT" sz="1500" dirty="0">
-                <a:latin typeface="MS UI Gothic" panose="020B0600070205080204" pitchFamily="34" charset="-128"/>
-                <a:ea typeface="MS UI Gothic" panose="020B0600070205080204" pitchFamily="34" charset="-128"/>
-              </a:rPr>
-              <a:t>Bases de Dados – MIEI – Universidade do Minho</a:t>
-            </a:r>
-          </a:p>
-        </p:txBody>
-      </p:sp>
+          <a:ln>
+            <a:noFill/>
+          </a:ln>
+          <a:extLst>
+            <a:ext uri="{909E8E84-426E-40DD-AFC4-6F175D3DCCD1}">
+              <a14:hiddenFill xmlns:a14="http://schemas.microsoft.com/office/drawing/2010/main">
+                <a:solidFill>
+                  <a:srgbClr val="FFFFFF"/>
+                </a:solidFill>
+              </a14:hiddenFill>
+            </a:ext>
+            <a:ext uri="{91240B29-F687-4F45-9708-019B960494DF}">
+              <a14:hiddenLine xmlns:a14="http://schemas.microsoft.com/office/drawing/2010/main" w="9525">
+                <a:solidFill>
+                  <a:srgbClr val="000000"/>
+                </a:solidFill>
+                <a:miter lim="800000"/>
+                <a:headEnd/>
+                <a:tailEnd/>
+              </a14:hiddenLine>
+            </a:ext>
+          </a:extLst>
+        </p:spPr>
+      </p:pic>
       <p:pic>
         <p:nvPicPr>
-          <p:cNvPr id="8" name="Imagem 7"/>
+          <p:cNvPr id="2051" name="Imagem 1" descr="queryClientesReservas"/>
           <p:cNvPicPr>
-            <a:picLocks noChangeAspect="1"/>
+            <a:picLocks noChangeAspect="1" noChangeArrowheads="1"/>
           </p:cNvPicPr>
           <p:nvPr/>
         </p:nvPicPr>
@@ -6381,23 +6797,638 @@
               </a:ext>
             </a:extLst>
           </a:blip>
+          <a:srcRect/>
           <a:stretch>
             <a:fillRect/>
           </a:stretch>
         </p:blipFill>
-        <p:spPr>
-          <a:xfrm>
-            <a:off x="4753724" y="4811294"/>
-            <a:ext cx="322332" cy="332206"/>
+        <p:spPr bwMode="auto">
+          <a:xfrm>
+            <a:off x="476545" y="1491630"/>
+            <a:ext cx="5103567" cy="576064"/>
           </a:xfrm>
           <a:prstGeom prst="rect">
             <a:avLst/>
           </a:prstGeom>
+          <a:noFill/>
+          <a:ln>
+            <a:noFill/>
+          </a:ln>
+          <a:extLst>
+            <a:ext uri="{909E8E84-426E-40DD-AFC4-6F175D3DCCD1}">
+              <a14:hiddenFill xmlns:a14="http://schemas.microsoft.com/office/drawing/2010/main">
+                <a:solidFill>
+                  <a:srgbClr val="FFFFFF"/>
+                </a:solidFill>
+              </a14:hiddenFill>
+            </a:ext>
+            <a:ext uri="{91240B29-F687-4F45-9708-019B960494DF}">
+              <a14:hiddenLine xmlns:a14="http://schemas.microsoft.com/office/drawing/2010/main" w="9525">
+                <a:solidFill>
+                  <a:srgbClr val="000000"/>
+                </a:solidFill>
+                <a:miter lim="800000"/>
+                <a:headEnd/>
+                <a:tailEnd/>
+              </a14:hiddenLine>
+            </a:ext>
+          </a:extLst>
         </p:spPr>
       </p:pic>
-      <p:sp>
-        <p:nvSpPr>
-          <p:cNvPr id="7" name="Marcador de Posição de Conteúdo 2"/>
+      <p:pic>
+        <p:nvPicPr>
+          <p:cNvPr id="2052" name="Imagem 2" descr="queryBilhetes"/>
+          <p:cNvPicPr>
+            <a:picLocks noChangeAspect="1" noChangeArrowheads="1"/>
+          </p:cNvPicPr>
+          <p:nvPr/>
+        </p:nvPicPr>
+        <p:blipFill>
+          <a:blip r:embed="rId4" cstate="print">
+            <a:extLst>
+              <a:ext uri="{28A0092B-C50C-407E-A947-70E740481C1C}">
+                <a14:useLocalDpi xmlns:a14="http://schemas.microsoft.com/office/drawing/2010/main" val="0"/>
+              </a:ext>
+            </a:extLst>
+          </a:blip>
+          <a:srcRect/>
+          <a:stretch>
+            <a:fillRect/>
+          </a:stretch>
+        </p:blipFill>
+        <p:spPr bwMode="auto">
+          <a:xfrm>
+            <a:off x="495994" y="2259300"/>
+            <a:ext cx="5084118" cy="1084971"/>
+          </a:xfrm>
+          <a:prstGeom prst="rect">
+            <a:avLst/>
+          </a:prstGeom>
+          <a:noFill/>
+          <a:ln>
+            <a:noFill/>
+          </a:ln>
+          <a:extLst>
+            <a:ext uri="{909E8E84-426E-40DD-AFC4-6F175D3DCCD1}">
+              <a14:hiddenFill xmlns:a14="http://schemas.microsoft.com/office/drawing/2010/main">
+                <a:solidFill>
+                  <a:srgbClr val="FFFFFF"/>
+                </a:solidFill>
+              </a14:hiddenFill>
+            </a:ext>
+            <a:ext uri="{91240B29-F687-4F45-9708-019B960494DF}">
+              <a14:hiddenLine xmlns:a14="http://schemas.microsoft.com/office/drawing/2010/main" w="9525">
+                <a:solidFill>
+                  <a:srgbClr val="000000"/>
+                </a:solidFill>
+                <a:miter lim="800000"/>
+                <a:headEnd/>
+                <a:tailEnd/>
+              </a14:hiddenLine>
+            </a:ext>
+          </a:extLst>
+        </p:spPr>
+      </p:pic>
+      <p:pic>
+        <p:nvPicPr>
+          <p:cNvPr id="2053" name="Imagem 3" descr="queryLugares"/>
+          <p:cNvPicPr>
+            <a:picLocks noChangeAspect="1" noChangeArrowheads="1"/>
+          </p:cNvPicPr>
+          <p:nvPr/>
+        </p:nvPicPr>
+        <p:blipFill>
+          <a:blip r:embed="rId5" cstate="print">
+            <a:extLst>
+              <a:ext uri="{28A0092B-C50C-407E-A947-70E740481C1C}">
+                <a14:useLocalDpi xmlns:a14="http://schemas.microsoft.com/office/drawing/2010/main" val="0"/>
+              </a:ext>
+            </a:extLst>
+          </a:blip>
+          <a:srcRect/>
+          <a:stretch>
+            <a:fillRect/>
+          </a:stretch>
+        </p:blipFill>
+        <p:spPr bwMode="auto">
+          <a:xfrm>
+            <a:off x="495995" y="3651870"/>
+            <a:ext cx="5084118" cy="430908"/>
+          </a:xfrm>
+          <a:prstGeom prst="rect">
+            <a:avLst/>
+          </a:prstGeom>
+          <a:noFill/>
+          <a:ln>
+            <a:noFill/>
+          </a:ln>
+          <a:extLst>
+            <a:ext uri="{909E8E84-426E-40DD-AFC4-6F175D3DCCD1}">
+              <a14:hiddenFill xmlns:a14="http://schemas.microsoft.com/office/drawing/2010/main">
+                <a:solidFill>
+                  <a:srgbClr val="FFFFFF"/>
+                </a:solidFill>
+              </a14:hiddenFill>
+            </a:ext>
+            <a:ext uri="{91240B29-F687-4F45-9708-019B960494DF}">
+              <a14:hiddenLine xmlns:a14="http://schemas.microsoft.com/office/drawing/2010/main" w="9525">
+                <a:solidFill>
+                  <a:srgbClr val="000000"/>
+                </a:solidFill>
+                <a:miter lim="800000"/>
+                <a:headEnd/>
+                <a:tailEnd/>
+              </a14:hiddenLine>
+            </a:ext>
+          </a:extLst>
+        </p:spPr>
+      </p:pic>
+      <p:sp>
+        <p:nvSpPr>
+          <p:cNvPr id="7" name="CaixaDeTexto 6"/>
+          <p:cNvSpPr txBox="1"/>
+          <p:nvPr/>
+        </p:nvSpPr>
+        <p:spPr>
+          <a:xfrm>
+            <a:off x="0" y="4786444"/>
+            <a:ext cx="4968552" cy="307777"/>
+          </a:xfrm>
+          <a:prstGeom prst="rect">
+            <a:avLst/>
+          </a:prstGeom>
+          <a:noFill/>
+        </p:spPr>
+        <p:txBody>
+          <a:bodyPr wrap="square" rtlCol="0">
+            <a:spAutoFit/>
+          </a:bodyPr>
+          <a:lstStyle/>
+          <a:p>
+            <a:r>
+              <a:rPr lang="pt-PT" sz="1400" b="1" u="sng" dirty="0">
+                <a:latin typeface="MS UI Gothic" panose="020B0600070205080204" pitchFamily="34" charset="-128"/>
+                <a:ea typeface="MS UI Gothic" panose="020B0600070205080204" pitchFamily="34" charset="-128"/>
+              </a:rPr>
+              <a:t>Carlos Pereira</a:t>
+            </a:r>
+            <a:r>
+              <a:rPr lang="pt-PT" sz="1400" dirty="0">
+                <a:latin typeface="MS UI Gothic" panose="020B0600070205080204" pitchFamily="34" charset="-128"/>
+                <a:ea typeface="MS UI Gothic" panose="020B0600070205080204" pitchFamily="34" charset="-128"/>
+              </a:rPr>
+              <a:t>, João Barreira, Tiago Bouças e Tiago Duarte</a:t>
+            </a:r>
+          </a:p>
+        </p:txBody>
+      </p:sp>
+      <p:sp>
+        <p:nvSpPr>
+          <p:cNvPr id="8" name="CaixaDeTexto 7"/>
+          <p:cNvSpPr txBox="1"/>
+          <p:nvPr/>
+        </p:nvSpPr>
+        <p:spPr>
+          <a:xfrm>
+            <a:off x="5076056" y="4797075"/>
+            <a:ext cx="4248472" cy="323165"/>
+          </a:xfrm>
+          <a:prstGeom prst="rect">
+            <a:avLst/>
+          </a:prstGeom>
+          <a:noFill/>
+        </p:spPr>
+        <p:txBody>
+          <a:bodyPr wrap="square" rtlCol="0">
+            <a:spAutoFit/>
+          </a:bodyPr>
+          <a:lstStyle/>
+          <a:p>
+            <a:r>
+              <a:rPr lang="pt-PT" sz="1500" dirty="0">
+                <a:latin typeface="MS UI Gothic" panose="020B0600070205080204" pitchFamily="34" charset="-128"/>
+                <a:ea typeface="MS UI Gothic" panose="020B0600070205080204" pitchFamily="34" charset="-128"/>
+              </a:rPr>
+              <a:t>Bases de Dados – MIEI – Universidade do Minho</a:t>
+            </a:r>
+          </a:p>
+        </p:txBody>
+      </p:sp>
+      <p:pic>
+        <p:nvPicPr>
+          <p:cNvPr id="9" name="Imagem 8"/>
+          <p:cNvPicPr>
+            <a:picLocks noChangeAspect="1"/>
+          </p:cNvPicPr>
+          <p:nvPr/>
+        </p:nvPicPr>
+        <p:blipFill>
+          <a:blip r:embed="rId6" cstate="print">
+            <a:extLst>
+              <a:ext uri="{28A0092B-C50C-407E-A947-70E740481C1C}">
+                <a14:useLocalDpi xmlns:a14="http://schemas.microsoft.com/office/drawing/2010/main" val="0"/>
+              </a:ext>
+            </a:extLst>
+          </a:blip>
+          <a:stretch>
+            <a:fillRect/>
+          </a:stretch>
+        </p:blipFill>
+        <p:spPr>
+          <a:xfrm>
+            <a:off x="4753724" y="4811294"/>
+            <a:ext cx="322332" cy="332206"/>
+          </a:xfrm>
+          <a:prstGeom prst="rect">
+            <a:avLst/>
+          </a:prstGeom>
+        </p:spPr>
+      </p:pic>
+    </p:spTree>
+    <p:extLst>
+      <p:ext uri="{BB962C8B-B14F-4D97-AF65-F5344CB8AC3E}">
+        <p14:creationId xmlns:p14="http://schemas.microsoft.com/office/powerpoint/2010/main" val="2678963926"/>
+      </p:ext>
+    </p:extLst>
+  </p:cSld>
+  <p:clrMapOvr>
+    <a:masterClrMapping/>
+  </p:clrMapOvr>
+</p:sld>
+</file>
+
+<file path=ppt/slides/slide15.xml><?xml version="1.0" encoding="utf-8"?>
+<p:sld xmlns:a="http://schemas.openxmlformats.org/drawingml/2006/main" xmlns:r="http://schemas.openxmlformats.org/officeDocument/2006/relationships" xmlns:p="http://schemas.openxmlformats.org/presentationml/2006/main">
+  <p:cSld>
+    <p:spTree>
+      <p:nvGrpSpPr>
+        <p:cNvPr id="1" name=""/>
+        <p:cNvGrpSpPr/>
+        <p:nvPr/>
+      </p:nvGrpSpPr>
+      <p:grpSpPr>
+        <a:xfrm>
+          <a:off x="0" y="0"/>
+          <a:ext cx="0" cy="0"/>
+          <a:chOff x="0" y="0"/>
+          <a:chExt cx="0" cy="0"/>
+        </a:xfrm>
+      </p:grpSpPr>
+      <p:sp>
+        <p:nvSpPr>
+          <p:cNvPr id="2" name="Título 1"/>
+          <p:cNvSpPr>
+            <a:spLocks noGrp="1"/>
+          </p:cNvSpPr>
+          <p:nvPr>
+            <p:ph type="title"/>
+          </p:nvPr>
+        </p:nvSpPr>
+        <p:spPr/>
+        <p:txBody>
+          <a:bodyPr/>
+          <a:lstStyle/>
+          <a:p>
+            <a:pPr algn="ctr"/>
+            <a:r>
+              <a:rPr lang="pt-PT" b="1" i="1" dirty="0" err="1"/>
+              <a:t>Queries</a:t>
+            </a:r>
+            <a:endParaRPr lang="pt-PT" b="1" i="1" dirty="0"/>
+          </a:p>
+        </p:txBody>
+      </p:sp>
+      <p:pic>
+        <p:nvPicPr>
+          <p:cNvPr id="3074" name="Picture 2" descr="1"/>
+          <p:cNvPicPr>
+            <a:picLocks noChangeAspect="1" noChangeArrowheads="1"/>
+          </p:cNvPicPr>
+          <p:nvPr/>
+        </p:nvPicPr>
+        <p:blipFill>
+          <a:blip r:embed="rId2">
+            <a:extLst>
+              <a:ext uri="{28A0092B-C50C-407E-A947-70E740481C1C}">
+                <a14:useLocalDpi xmlns:a14="http://schemas.microsoft.com/office/drawing/2010/main" val="0"/>
+              </a:ext>
+            </a:extLst>
+          </a:blip>
+          <a:srcRect/>
+          <a:stretch>
+            <a:fillRect/>
+          </a:stretch>
+        </p:blipFill>
+        <p:spPr bwMode="auto">
+          <a:xfrm>
+            <a:off x="1979712" y="1491630"/>
+            <a:ext cx="5076825" cy="190500"/>
+          </a:xfrm>
+          <a:prstGeom prst="rect">
+            <a:avLst/>
+          </a:prstGeom>
+          <a:noFill/>
+          <a:ln>
+            <a:noFill/>
+          </a:ln>
+          <a:extLst>
+            <a:ext uri="{909E8E84-426E-40DD-AFC4-6F175D3DCCD1}">
+              <a14:hiddenFill xmlns:a14="http://schemas.microsoft.com/office/drawing/2010/main">
+                <a:solidFill>
+                  <a:srgbClr val="FFFFFF"/>
+                </a:solidFill>
+              </a14:hiddenFill>
+            </a:ext>
+            <a:ext uri="{91240B29-F687-4F45-9708-019B960494DF}">
+              <a14:hiddenLine xmlns:a14="http://schemas.microsoft.com/office/drawing/2010/main" w="9525">
+                <a:solidFill>
+                  <a:srgbClr val="000000"/>
+                </a:solidFill>
+                <a:miter lim="800000"/>
+                <a:headEnd/>
+                <a:tailEnd/>
+              </a14:hiddenLine>
+            </a:ext>
+          </a:extLst>
+        </p:spPr>
+      </p:pic>
+      <p:pic>
+        <p:nvPicPr>
+          <p:cNvPr id="3075" name="Picture 3" descr="4"/>
+          <p:cNvPicPr>
+            <a:picLocks noChangeAspect="1" noChangeArrowheads="1"/>
+          </p:cNvPicPr>
+          <p:nvPr/>
+        </p:nvPicPr>
+        <p:blipFill>
+          <a:blip r:embed="rId3">
+            <a:extLst>
+              <a:ext uri="{28A0092B-C50C-407E-A947-70E740481C1C}">
+                <a14:useLocalDpi xmlns:a14="http://schemas.microsoft.com/office/drawing/2010/main" val="0"/>
+              </a:ext>
+            </a:extLst>
+          </a:blip>
+          <a:srcRect/>
+          <a:stretch>
+            <a:fillRect/>
+          </a:stretch>
+        </p:blipFill>
+        <p:spPr bwMode="auto">
+          <a:xfrm>
+            <a:off x="1770161" y="2067694"/>
+            <a:ext cx="5495925" cy="180975"/>
+          </a:xfrm>
+          <a:prstGeom prst="rect">
+            <a:avLst/>
+          </a:prstGeom>
+          <a:noFill/>
+          <a:ln>
+            <a:noFill/>
+          </a:ln>
+          <a:extLst>
+            <a:ext uri="{909E8E84-426E-40DD-AFC4-6F175D3DCCD1}">
+              <a14:hiddenFill xmlns:a14="http://schemas.microsoft.com/office/drawing/2010/main">
+                <a:solidFill>
+                  <a:srgbClr val="FFFFFF"/>
+                </a:solidFill>
+              </a14:hiddenFill>
+            </a:ext>
+            <a:ext uri="{91240B29-F687-4F45-9708-019B960494DF}">
+              <a14:hiddenLine xmlns:a14="http://schemas.microsoft.com/office/drawing/2010/main" w="9525">
+                <a:solidFill>
+                  <a:srgbClr val="000000"/>
+                </a:solidFill>
+                <a:miter lim="800000"/>
+                <a:headEnd/>
+                <a:tailEnd/>
+              </a14:hiddenLine>
+            </a:ext>
+          </a:extLst>
+        </p:spPr>
+      </p:pic>
+      <p:pic>
+        <p:nvPicPr>
+          <p:cNvPr id="3076" name="Picture 4" descr="6"/>
+          <p:cNvPicPr>
+            <a:picLocks noChangeAspect="1" noChangeArrowheads="1"/>
+          </p:cNvPicPr>
+          <p:nvPr/>
+        </p:nvPicPr>
+        <p:blipFill>
+          <a:blip r:embed="rId4">
+            <a:extLst>
+              <a:ext uri="{28A0092B-C50C-407E-A947-70E740481C1C}">
+                <a14:useLocalDpi xmlns:a14="http://schemas.microsoft.com/office/drawing/2010/main" val="0"/>
+              </a:ext>
+            </a:extLst>
+          </a:blip>
+          <a:srcRect/>
+          <a:stretch>
+            <a:fillRect/>
+          </a:stretch>
+        </p:blipFill>
+        <p:spPr bwMode="auto">
+          <a:xfrm>
+            <a:off x="1913979" y="2556545"/>
+            <a:ext cx="5394325" cy="2103437"/>
+          </a:xfrm>
+          <a:prstGeom prst="rect">
+            <a:avLst/>
+          </a:prstGeom>
+          <a:noFill/>
+          <a:ln>
+            <a:noFill/>
+          </a:ln>
+          <a:extLst>
+            <a:ext uri="{909E8E84-426E-40DD-AFC4-6F175D3DCCD1}">
+              <a14:hiddenFill xmlns:a14="http://schemas.microsoft.com/office/drawing/2010/main">
+                <a:solidFill>
+                  <a:srgbClr val="FFFFFF"/>
+                </a:solidFill>
+              </a14:hiddenFill>
+            </a:ext>
+            <a:ext uri="{91240B29-F687-4F45-9708-019B960494DF}">
+              <a14:hiddenLine xmlns:a14="http://schemas.microsoft.com/office/drawing/2010/main" w="9525">
+                <a:solidFill>
+                  <a:srgbClr val="000000"/>
+                </a:solidFill>
+                <a:miter lim="800000"/>
+                <a:headEnd/>
+                <a:tailEnd/>
+              </a14:hiddenLine>
+            </a:ext>
+          </a:extLst>
+        </p:spPr>
+      </p:pic>
+      <p:sp>
+        <p:nvSpPr>
+          <p:cNvPr id="6" name="CaixaDeTexto 5"/>
+          <p:cNvSpPr txBox="1"/>
+          <p:nvPr/>
+        </p:nvSpPr>
+        <p:spPr>
+          <a:xfrm>
+            <a:off x="0" y="4786444"/>
+            <a:ext cx="4968552" cy="307777"/>
+          </a:xfrm>
+          <a:prstGeom prst="rect">
+            <a:avLst/>
+          </a:prstGeom>
+          <a:noFill/>
+        </p:spPr>
+        <p:txBody>
+          <a:bodyPr wrap="square" rtlCol="0">
+            <a:spAutoFit/>
+          </a:bodyPr>
+          <a:lstStyle/>
+          <a:p>
+            <a:r>
+              <a:rPr lang="pt-PT" sz="1400" dirty="0">
+                <a:latin typeface="MS UI Gothic" panose="020B0600070205080204" pitchFamily="34" charset="-128"/>
+                <a:ea typeface="MS UI Gothic" panose="020B0600070205080204" pitchFamily="34" charset="-128"/>
+              </a:rPr>
+              <a:t>Carlos Pereira, João Barreira, Tiago Bouças e </a:t>
+            </a:r>
+            <a:r>
+              <a:rPr lang="pt-PT" sz="1400" b="1" u="sng" dirty="0">
+                <a:latin typeface="MS UI Gothic" panose="020B0600070205080204" pitchFamily="34" charset="-128"/>
+                <a:ea typeface="MS UI Gothic" panose="020B0600070205080204" pitchFamily="34" charset="-128"/>
+              </a:rPr>
+              <a:t>Tiago Duarte</a:t>
+            </a:r>
+          </a:p>
+        </p:txBody>
+      </p:sp>
+      <p:sp>
+        <p:nvSpPr>
+          <p:cNvPr id="7" name="CaixaDeTexto 6"/>
+          <p:cNvSpPr txBox="1"/>
+          <p:nvPr/>
+        </p:nvSpPr>
+        <p:spPr>
+          <a:xfrm>
+            <a:off x="5076056" y="4797075"/>
+            <a:ext cx="4248472" cy="323165"/>
+          </a:xfrm>
+          <a:prstGeom prst="rect">
+            <a:avLst/>
+          </a:prstGeom>
+          <a:noFill/>
+        </p:spPr>
+        <p:txBody>
+          <a:bodyPr wrap="square" rtlCol="0">
+            <a:spAutoFit/>
+          </a:bodyPr>
+          <a:lstStyle/>
+          <a:p>
+            <a:r>
+              <a:rPr lang="pt-PT" sz="1500" dirty="0">
+                <a:latin typeface="MS UI Gothic" panose="020B0600070205080204" pitchFamily="34" charset="-128"/>
+                <a:ea typeface="MS UI Gothic" panose="020B0600070205080204" pitchFamily="34" charset="-128"/>
+              </a:rPr>
+              <a:t>Bases de Dados – MIEI – Universidade do Minho</a:t>
+            </a:r>
+          </a:p>
+        </p:txBody>
+      </p:sp>
+      <p:pic>
+        <p:nvPicPr>
+          <p:cNvPr id="8" name="Imagem 7"/>
+          <p:cNvPicPr>
+            <a:picLocks noChangeAspect="1"/>
+          </p:cNvPicPr>
+          <p:nvPr/>
+        </p:nvPicPr>
+        <p:blipFill>
+          <a:blip r:embed="rId5" cstate="print">
+            <a:extLst>
+              <a:ext uri="{28A0092B-C50C-407E-A947-70E740481C1C}">
+                <a14:useLocalDpi xmlns:a14="http://schemas.microsoft.com/office/drawing/2010/main" val="0"/>
+              </a:ext>
+            </a:extLst>
+          </a:blip>
+          <a:stretch>
+            <a:fillRect/>
+          </a:stretch>
+        </p:blipFill>
+        <p:spPr>
+          <a:xfrm>
+            <a:off x="4753724" y="4811294"/>
+            <a:ext cx="322332" cy="332206"/>
+          </a:xfrm>
+          <a:prstGeom prst="rect">
+            <a:avLst/>
+          </a:prstGeom>
+        </p:spPr>
+      </p:pic>
+    </p:spTree>
+    <p:extLst>
+      <p:ext uri="{BB962C8B-B14F-4D97-AF65-F5344CB8AC3E}">
+        <p14:creationId xmlns:p14="http://schemas.microsoft.com/office/powerpoint/2010/main" val="1762999018"/>
+      </p:ext>
+    </p:extLst>
+  </p:cSld>
+  <p:clrMapOvr>
+    <a:masterClrMapping/>
+  </p:clrMapOvr>
+</p:sld>
+</file>
+
+<file path=ppt/slides/slide16.xml><?xml version="1.0" encoding="utf-8"?>
+<p:sld xmlns:a="http://schemas.openxmlformats.org/drawingml/2006/main" xmlns:r="http://schemas.openxmlformats.org/officeDocument/2006/relationships" xmlns:p="http://schemas.openxmlformats.org/presentationml/2006/main">
+  <p:cSld>
+    <p:spTree>
+      <p:nvGrpSpPr>
+        <p:cNvPr id="1" name=""/>
+        <p:cNvGrpSpPr/>
+        <p:nvPr/>
+      </p:nvGrpSpPr>
+      <p:grpSpPr>
+        <a:xfrm>
+          <a:off x="0" y="0"/>
+          <a:ext cx="0" cy="0"/>
+          <a:chOff x="0" y="0"/>
+          <a:chExt cx="0" cy="0"/>
+        </a:xfrm>
+      </p:grpSpPr>
+      <p:sp>
+        <p:nvSpPr>
+          <p:cNvPr id="2" name="Título 1"/>
+          <p:cNvSpPr>
+            <a:spLocks noGrp="1"/>
+          </p:cNvSpPr>
+          <p:nvPr>
+            <p:ph type="title"/>
+          </p:nvPr>
+        </p:nvSpPr>
+        <p:spPr/>
+        <p:txBody>
+          <a:bodyPr/>
+          <a:lstStyle/>
+          <a:p>
+            <a:pPr algn="ctr"/>
+            <a:r>
+              <a:rPr lang="pt-PT" b="1" i="1" dirty="0" err="1"/>
+              <a:t>NoSQL</a:t>
+            </a:r>
+            <a:r>
+              <a:rPr lang="pt-PT" b="1" i="1" dirty="0"/>
+              <a:t> </a:t>
+            </a:r>
+            <a:r>
+              <a:rPr lang="pt-PT" b="1" dirty="0" err="1"/>
+              <a:t>vs</a:t>
+            </a:r>
+            <a:r>
+              <a:rPr lang="pt-PT" b="1" i="1" dirty="0"/>
+              <a:t> SQL</a:t>
+            </a:r>
+          </a:p>
+        </p:txBody>
+      </p:sp>
+      <p:sp>
+        <p:nvSpPr>
+          <p:cNvPr id="7" name="Marcador de Posição de Conteúdo 4"/>
           <p:cNvSpPr>
             <a:spLocks noGrp="1"/>
           </p:cNvSpPr>
@@ -6407,13 +7438,55 @@
         </p:nvSpPr>
         <p:spPr>
           <a:xfrm>
-            <a:off x="850168" y="1779662"/>
+            <a:off x="822960" y="1384301"/>
             <a:ext cx="7543800" cy="3017520"/>
           </a:xfrm>
         </p:spPr>
         <p:txBody>
-          <a:bodyPr/>
-          <a:lstStyle/>
+          <a:bodyPr>
+            <a:normAutofit/>
+          </a:bodyPr>
+          <a:lstStyle/>
+          <a:p>
+            <a:pPr>
+              <a:buFont typeface="Wingdings" panose="05000000000000000000" pitchFamily="2" charset="2"/>
+              <a:buChar char="Ø"/>
+            </a:pPr>
+            <a:r>
+              <a:rPr lang="pt-PT" sz="2000" dirty="0"/>
+              <a:t>Redundância de dados</a:t>
+            </a:r>
+          </a:p>
+          <a:p>
+            <a:pPr>
+              <a:buFont typeface="Wingdings" panose="05000000000000000000" pitchFamily="2" charset="2"/>
+              <a:buChar char="Ø"/>
+            </a:pPr>
+            <a:r>
+              <a:rPr lang="pt-PT" sz="2000" dirty="0"/>
+              <a:t>Maior flexibilidade na inserção de dados</a:t>
+            </a:r>
+          </a:p>
+          <a:p>
+            <a:pPr>
+              <a:buFont typeface="Wingdings" panose="05000000000000000000" pitchFamily="2" charset="2"/>
+              <a:buChar char="Ø"/>
+            </a:pPr>
+            <a:r>
+              <a:rPr lang="pt-PT" sz="2000" dirty="0"/>
+              <a:t>Maior Escalabilidade</a:t>
+            </a:r>
+          </a:p>
+          <a:p>
+            <a:pPr>
+              <a:buFont typeface="Wingdings" panose="05000000000000000000" pitchFamily="2" charset="2"/>
+              <a:buChar char="Ø"/>
+            </a:pPr>
+            <a:r>
+              <a:rPr lang="pt-PT" sz="2000" dirty="0"/>
+              <a:t>Melhor desempenho</a:t>
+            </a:r>
+          </a:p>
           <a:p>
             <a:pPr>
               <a:buFont typeface="Wingdings" panose="05000000000000000000" pitchFamily="2" charset="2"/>
@@ -6421,12 +7494,127 @@
             </a:pPr>
             <a:endParaRPr lang="pt-PT" dirty="0"/>
           </a:p>
-        </p:txBody>
-      </p:sp>
+          <a:p>
+            <a:pPr>
+              <a:buFont typeface="Wingdings" panose="05000000000000000000" pitchFamily="2" charset="2"/>
+              <a:buChar char="Ø"/>
+            </a:pPr>
+            <a:endParaRPr lang="pt-PT" dirty="0"/>
+          </a:p>
+        </p:txBody>
+      </p:sp>
+      <p:sp>
+        <p:nvSpPr>
+          <p:cNvPr id="8" name="CaixaDeTexto 7"/>
+          <p:cNvSpPr txBox="1"/>
+          <p:nvPr/>
+        </p:nvSpPr>
+        <p:spPr>
+          <a:xfrm>
+            <a:off x="0" y="4786444"/>
+            <a:ext cx="4968552" cy="307777"/>
+          </a:xfrm>
+          <a:prstGeom prst="rect">
+            <a:avLst/>
+          </a:prstGeom>
+          <a:noFill/>
+        </p:spPr>
+        <p:txBody>
+          <a:bodyPr wrap="square" rtlCol="0">
+            <a:spAutoFit/>
+          </a:bodyPr>
+          <a:lstStyle/>
+          <a:p>
+            <a:r>
+              <a:rPr lang="pt-PT" sz="1400" dirty="0">
+                <a:latin typeface="MS UI Gothic" panose="020B0600070205080204" pitchFamily="34" charset="-128"/>
+                <a:ea typeface="MS UI Gothic" panose="020B0600070205080204" pitchFamily="34" charset="-128"/>
+              </a:rPr>
+              <a:t>Carlos Pereira, </a:t>
+            </a:r>
+            <a:r>
+              <a:rPr lang="pt-PT" sz="1400" b="1" u="sng" dirty="0">
+                <a:latin typeface="MS UI Gothic" panose="020B0600070205080204" pitchFamily="34" charset="-128"/>
+                <a:ea typeface="MS UI Gothic" panose="020B0600070205080204" pitchFamily="34" charset="-128"/>
+              </a:rPr>
+              <a:t>João Barreira</a:t>
+            </a:r>
+            <a:r>
+              <a:rPr lang="pt-PT" sz="1400" dirty="0">
+                <a:latin typeface="MS UI Gothic" panose="020B0600070205080204" pitchFamily="34" charset="-128"/>
+                <a:ea typeface="MS UI Gothic" panose="020B0600070205080204" pitchFamily="34" charset="-128"/>
+              </a:rPr>
+              <a:t>, Tiago Bouças e Tiago Duarte</a:t>
+            </a:r>
+          </a:p>
+        </p:txBody>
+      </p:sp>
+      <p:sp>
+        <p:nvSpPr>
+          <p:cNvPr id="9" name="CaixaDeTexto 8"/>
+          <p:cNvSpPr txBox="1"/>
+          <p:nvPr/>
+        </p:nvSpPr>
+        <p:spPr>
+          <a:xfrm>
+            <a:off x="5076056" y="4797075"/>
+            <a:ext cx="4248472" cy="323165"/>
+          </a:xfrm>
+          <a:prstGeom prst="rect">
+            <a:avLst/>
+          </a:prstGeom>
+          <a:noFill/>
+        </p:spPr>
+        <p:txBody>
+          <a:bodyPr wrap="square" rtlCol="0">
+            <a:spAutoFit/>
+          </a:bodyPr>
+          <a:lstStyle/>
+          <a:p>
+            <a:r>
+              <a:rPr lang="pt-PT" sz="1500" dirty="0">
+                <a:latin typeface="MS UI Gothic" panose="020B0600070205080204" pitchFamily="34" charset="-128"/>
+                <a:ea typeface="MS UI Gothic" panose="020B0600070205080204" pitchFamily="34" charset="-128"/>
+              </a:rPr>
+              <a:t>Bases de Dados – MIEI – Universidade do Minho</a:t>
+            </a:r>
+          </a:p>
+        </p:txBody>
+      </p:sp>
+      <p:pic>
+        <p:nvPicPr>
+          <p:cNvPr id="10" name="Imagem 9"/>
+          <p:cNvPicPr>
+            <a:picLocks noChangeAspect="1"/>
+          </p:cNvPicPr>
+          <p:nvPr/>
+        </p:nvPicPr>
+        <p:blipFill>
+          <a:blip r:embed="rId2" cstate="print">
+            <a:extLst>
+              <a:ext uri="{28A0092B-C50C-407E-A947-70E740481C1C}">
+                <a14:useLocalDpi xmlns:a14="http://schemas.microsoft.com/office/drawing/2010/main" val="0"/>
+              </a:ext>
+            </a:extLst>
+          </a:blip>
+          <a:stretch>
+            <a:fillRect/>
+          </a:stretch>
+        </p:blipFill>
+        <p:spPr>
+          <a:xfrm>
+            <a:off x="4753724" y="4811294"/>
+            <a:ext cx="322332" cy="332206"/>
+          </a:xfrm>
+          <a:prstGeom prst="rect">
+            <a:avLst/>
+          </a:prstGeom>
+        </p:spPr>
+      </p:pic>
     </p:spTree>
     <p:extLst>
       <p:ext uri="{BB962C8B-B14F-4D97-AF65-F5344CB8AC3E}">
-        <p14:creationId xmlns:p14="http://schemas.microsoft.com/office/powerpoint/2010/main" val="1685181694"/>
+        <p14:creationId xmlns:p14="http://schemas.microsoft.com/office/powerpoint/2010/main" val="1130335737"/>
       </p:ext>
     </p:extLst>
   </p:cSld>
@@ -6564,13 +7752,14 @@
               <a:buChar char="Ø"/>
             </a:pPr>
             <a:r>
-              <a:rPr lang="pt-PT" dirty="0" err="1"/>
-              <a:t>MongoDB</a:t>
-            </a:r>
-            <a:r>
               <a:rPr lang="pt-PT" dirty="0"/>
-              <a:t> (TP2)</a:t>
-            </a:r>
+              <a:t>Migração para </a:t>
+            </a:r>
+            <a:r>
+              <a:rPr lang="pt-PT" i="1" dirty="0" err="1"/>
+              <a:t>NoSQL</a:t>
+            </a:r>
+            <a:endParaRPr lang="pt-PT" i="1" dirty="0"/>
           </a:p>
           <a:p>
             <a:pPr>
@@ -6595,6 +7784,107 @@
           </a:p>
         </p:txBody>
       </p:sp>
+      <p:sp>
+        <p:nvSpPr>
+          <p:cNvPr id="4" name="CaixaDeTexto 3"/>
+          <p:cNvSpPr txBox="1"/>
+          <p:nvPr/>
+        </p:nvSpPr>
+        <p:spPr>
+          <a:xfrm>
+            <a:off x="0" y="4786444"/>
+            <a:ext cx="4968552" cy="307777"/>
+          </a:xfrm>
+          <a:prstGeom prst="rect">
+            <a:avLst/>
+          </a:prstGeom>
+          <a:noFill/>
+        </p:spPr>
+        <p:txBody>
+          <a:bodyPr wrap="square" rtlCol="0">
+            <a:spAutoFit/>
+          </a:bodyPr>
+          <a:lstStyle/>
+          <a:p>
+            <a:r>
+              <a:rPr lang="pt-PT" sz="1400" b="1" u="sng" dirty="0">
+                <a:latin typeface="MS UI Gothic" panose="020B0600070205080204" pitchFamily="34" charset="-128"/>
+                <a:ea typeface="MS UI Gothic" panose="020B0600070205080204" pitchFamily="34" charset="-128"/>
+              </a:rPr>
+              <a:t>Carlos Pereira</a:t>
+            </a:r>
+            <a:r>
+              <a:rPr lang="pt-PT" sz="1400" dirty="0">
+                <a:latin typeface="MS UI Gothic" panose="020B0600070205080204" pitchFamily="34" charset="-128"/>
+                <a:ea typeface="MS UI Gothic" panose="020B0600070205080204" pitchFamily="34" charset="-128"/>
+              </a:rPr>
+              <a:t>, João Barreira, Tiago Bouças e Tiago Duarte</a:t>
+            </a:r>
+          </a:p>
+        </p:txBody>
+      </p:sp>
+      <p:sp>
+        <p:nvSpPr>
+          <p:cNvPr id="5" name="CaixaDeTexto 4"/>
+          <p:cNvSpPr txBox="1"/>
+          <p:nvPr/>
+        </p:nvSpPr>
+        <p:spPr>
+          <a:xfrm>
+            <a:off x="5076056" y="4797075"/>
+            <a:ext cx="4248472" cy="323165"/>
+          </a:xfrm>
+          <a:prstGeom prst="rect">
+            <a:avLst/>
+          </a:prstGeom>
+          <a:noFill/>
+        </p:spPr>
+        <p:txBody>
+          <a:bodyPr wrap="square" rtlCol="0">
+            <a:spAutoFit/>
+          </a:bodyPr>
+          <a:lstStyle/>
+          <a:p>
+            <a:r>
+              <a:rPr lang="pt-PT" sz="1500" dirty="0">
+                <a:latin typeface="MS UI Gothic" panose="020B0600070205080204" pitchFamily="34" charset="-128"/>
+                <a:ea typeface="MS UI Gothic" panose="020B0600070205080204" pitchFamily="34" charset="-128"/>
+              </a:rPr>
+              <a:t>Bases de Dados – MIEI – Universidade do Minho</a:t>
+            </a:r>
+          </a:p>
+        </p:txBody>
+      </p:sp>
+      <p:pic>
+        <p:nvPicPr>
+          <p:cNvPr id="6" name="Imagem 5"/>
+          <p:cNvPicPr>
+            <a:picLocks noChangeAspect="1"/>
+          </p:cNvPicPr>
+          <p:nvPr/>
+        </p:nvPicPr>
+        <p:blipFill>
+          <a:blip r:embed="rId2" cstate="print">
+            <a:extLst>
+              <a:ext uri="{28A0092B-C50C-407E-A947-70E740481C1C}">
+                <a14:useLocalDpi xmlns:a14="http://schemas.microsoft.com/office/drawing/2010/main" val="0"/>
+              </a:ext>
+            </a:extLst>
+          </a:blip>
+          <a:stretch>
+            <a:fillRect/>
+          </a:stretch>
+        </p:blipFill>
+        <p:spPr>
+          <a:xfrm>
+            <a:off x="4753724" y="4811294"/>
+            <a:ext cx="322332" cy="332206"/>
+          </a:xfrm>
+          <a:prstGeom prst="rect">
+            <a:avLst/>
+          </a:prstGeom>
+        </p:spPr>
+      </p:pic>
     </p:spTree>
     <p:extLst>
       <p:ext uri="{BB962C8B-B14F-4D97-AF65-F5344CB8AC3E}">
@@ -6679,11 +7969,18 @@
           <a:lstStyle/>
           <a:p>
             <a:r>
+              <a:rPr lang="pt-PT" sz="1400" b="1" u="sng" dirty="0">
+                <a:latin typeface="MS UI Gothic" panose="020B0600070205080204" pitchFamily="34" charset="-128"/>
+                <a:ea typeface="MS UI Gothic" panose="020B0600070205080204" pitchFamily="34" charset="-128"/>
+              </a:rPr>
+              <a:t>Carlos Pereira</a:t>
+            </a:r>
+            <a:r>
               <a:rPr lang="pt-PT" sz="1400" dirty="0">
                 <a:latin typeface="MS UI Gothic" panose="020B0600070205080204" pitchFamily="34" charset="-128"/>
                 <a:ea typeface="MS UI Gothic" panose="020B0600070205080204" pitchFamily="34" charset="-128"/>
               </a:rPr>
-              <a:t>Carlos Pereira, João Barreira, Tiago Bouças e Tiago Duarte</a:t>
+              <a:t>, João Barreira, Tiago Bouças e Tiago Duarte</a:t>
             </a:r>
           </a:p>
         </p:txBody>
@@ -6885,11 +8182,18 @@
           <a:lstStyle/>
           <a:p>
             <a:r>
+              <a:rPr lang="pt-PT" sz="1400" b="1" u="sng" dirty="0">
+                <a:latin typeface="MS UI Gothic" panose="020B0600070205080204" pitchFamily="34" charset="-128"/>
+                <a:ea typeface="MS UI Gothic" panose="020B0600070205080204" pitchFamily="34" charset="-128"/>
+              </a:rPr>
+              <a:t>Carlos Pereira</a:t>
+            </a:r>
+            <a:r>
               <a:rPr lang="pt-PT" sz="1400" dirty="0">
                 <a:latin typeface="MS UI Gothic" panose="020B0600070205080204" pitchFamily="34" charset="-128"/>
                 <a:ea typeface="MS UI Gothic" panose="020B0600070205080204" pitchFamily="34" charset="-128"/>
               </a:rPr>
-              <a:t>Carlos Pereira, João Barreira, Tiago Bouças e Tiago Duarte</a:t>
+              <a:t>, João Barreira, Tiago Bouças e Tiago Duarte</a:t>
             </a:r>
           </a:p>
         </p:txBody>
@@ -7102,37 +8406,6 @@
       </p:grpSpPr>
       <p:sp>
         <p:nvSpPr>
-          <p:cNvPr id="2" name="Título 1"/>
-          <p:cNvSpPr>
-            <a:spLocks noGrp="1"/>
-          </p:cNvSpPr>
-          <p:nvPr>
-            <p:ph type="title"/>
-          </p:nvPr>
-        </p:nvSpPr>
-        <p:spPr>
-          <a:xfrm>
-            <a:off x="827584" y="267494"/>
-            <a:ext cx="7704856" cy="1088068"/>
-          </a:xfrm>
-        </p:spPr>
-        <p:txBody>
-          <a:bodyPr/>
-          <a:lstStyle/>
-          <a:p>
-            <a:pPr algn="ctr"/>
-            <a:r>
-              <a:rPr lang="pt-PT" b="1" dirty="0">
-                <a:latin typeface="MS UI Gothic" panose="020B0600070205080204" pitchFamily="34" charset="-128"/>
-                <a:ea typeface="MS UI Gothic" panose="020B0600070205080204" pitchFamily="34" charset="-128"/>
-              </a:rPr>
-              <a:t>Construção do Modelo Conceptual</a:t>
-            </a:r>
-          </a:p>
-        </p:txBody>
-      </p:sp>
-      <p:sp>
-        <p:nvSpPr>
           <p:cNvPr id="4" name="CaixaDeTexto 3"/>
           <p:cNvSpPr txBox="1"/>
           <p:nvPr/>
@@ -7158,7 +8431,14 @@
                 <a:latin typeface="MS UI Gothic" panose="020B0600070205080204" pitchFamily="34" charset="-128"/>
                 <a:ea typeface="MS UI Gothic" panose="020B0600070205080204" pitchFamily="34" charset="-128"/>
               </a:rPr>
-              <a:t>Carlos Pereira, João Barreira, Tiago Bouças e Tiago Duarte</a:t>
+              <a:t>Carlos Pereira, João Barreira, Tiago Bouças e </a:t>
+            </a:r>
+            <a:r>
+              <a:rPr lang="pt-PT" sz="1400" b="1" u="sng" dirty="0">
+                <a:latin typeface="MS UI Gothic" panose="020B0600070205080204" pitchFamily="34" charset="-128"/>
+                <a:ea typeface="MS UI Gothic" panose="020B0600070205080204" pitchFamily="34" charset="-128"/>
+              </a:rPr>
+              <a:t>Tiago Duarte</a:t>
             </a:r>
           </a:p>
         </p:txBody>
@@ -7225,108 +8505,67 @@
           </a:prstGeom>
         </p:spPr>
       </p:pic>
-      <p:sp>
-        <p:nvSpPr>
-          <p:cNvPr id="7" name="Marcador de Posição de Conteúdo 2"/>
-          <p:cNvSpPr>
-            <a:spLocks noGrp="1"/>
-          </p:cNvSpPr>
+      <p:pic>
+        <p:nvPicPr>
+          <p:cNvPr id="13" name="Marcador de Posição de Conteúdo 3"/>
+          <p:cNvPicPr>
+            <a:picLocks noGrp="1" noChangeAspect="1"/>
+          </p:cNvPicPr>
           <p:nvPr>
             <p:ph idx="1"/>
           </p:nvPr>
-        </p:nvSpPr>
-        <p:spPr>
-          <a:xfrm>
-            <a:off x="850168" y="1779662"/>
-            <a:ext cx="7543800" cy="3017520"/>
+        </p:nvPicPr>
+        <p:blipFill>
+          <a:blip r:embed="rId4"/>
+          <a:stretch>
+            <a:fillRect/>
+          </a:stretch>
+        </p:blipFill>
+        <p:spPr>
+          <a:xfrm>
+            <a:off x="395536" y="627534"/>
+            <a:ext cx="8280920" cy="4104456"/>
+          </a:xfrm>
+          <a:prstGeom prst="rect">
+            <a:avLst/>
+          </a:prstGeom>
+        </p:spPr>
+      </p:pic>
+      <p:sp>
+        <p:nvSpPr>
+          <p:cNvPr id="7" name="Título 1"/>
+          <p:cNvSpPr>
+            <a:spLocks noGrp="1"/>
+          </p:cNvSpPr>
+          <p:nvPr>
+            <p:ph type="title"/>
+          </p:nvPr>
+        </p:nvSpPr>
+        <p:spPr>
+          <a:xfrm>
+            <a:off x="901296" y="79939"/>
+            <a:ext cx="7704856" cy="558441"/>
           </a:xfrm>
         </p:spPr>
         <p:txBody>
           <a:bodyPr/>
           <a:lstStyle/>
           <a:p>
-            <a:pPr>
-              <a:buFont typeface="Wingdings" panose="05000000000000000000" pitchFamily="2" charset="2"/>
-              <a:buChar char="Ø"/>
-            </a:pPr>
-            <a:r>
-              <a:rPr lang="pt-PT" dirty="0"/>
-              <a:t>Identificação das identidades</a:t>
-            </a:r>
-          </a:p>
-          <a:p>
-            <a:pPr>
-              <a:buFont typeface="Wingdings" panose="05000000000000000000" pitchFamily="2" charset="2"/>
-              <a:buChar char="Ø"/>
-            </a:pPr>
-            <a:r>
-              <a:rPr lang="pt-PT" dirty="0"/>
-              <a:t>Identificação dos relacionamentos</a:t>
-            </a:r>
-          </a:p>
-          <a:p>
-            <a:pPr>
-              <a:buFont typeface="Wingdings" panose="05000000000000000000" pitchFamily="2" charset="2"/>
-              <a:buChar char="Ø"/>
-            </a:pPr>
-            <a:r>
-              <a:rPr lang="pt-PT" dirty="0"/>
-              <a:t>Determinação das multiplicidades</a:t>
-            </a:r>
-          </a:p>
-          <a:p>
-            <a:pPr>
-              <a:buFont typeface="Wingdings" panose="05000000000000000000" pitchFamily="2" charset="2"/>
-              <a:buChar char="Ø"/>
-            </a:pPr>
-            <a:r>
-              <a:rPr lang="pt-PT" dirty="0"/>
-              <a:t>Identificação dos atributos e definição dos seus domínios</a:t>
-            </a:r>
-          </a:p>
-          <a:p>
-            <a:pPr>
-              <a:buFont typeface="Wingdings" panose="05000000000000000000" pitchFamily="2" charset="2"/>
-              <a:buChar char="Ø"/>
-            </a:pPr>
-            <a:r>
-              <a:rPr lang="pt-PT" dirty="0"/>
-              <a:t>Definição das chaves candidatas, primárias e alternativas</a:t>
-            </a:r>
-          </a:p>
-          <a:p>
-            <a:pPr>
-              <a:buFont typeface="Wingdings" panose="05000000000000000000" pitchFamily="2" charset="2"/>
-              <a:buChar char="Ø"/>
-            </a:pPr>
-            <a:r>
-              <a:rPr lang="pt-PT" dirty="0"/>
-              <a:t>Verificação de redundâncias</a:t>
-            </a:r>
-          </a:p>
-          <a:p>
-            <a:pPr>
-              <a:buFont typeface="Wingdings" panose="05000000000000000000" pitchFamily="2" charset="2"/>
-              <a:buChar char="Ø"/>
-            </a:pPr>
-            <a:r>
-              <a:rPr lang="pt-PT" dirty="0"/>
-              <a:t>Validação do modelo</a:t>
-            </a:r>
-          </a:p>
-          <a:p>
-            <a:pPr>
-              <a:buFont typeface="Wingdings" panose="05000000000000000000" pitchFamily="2" charset="2"/>
-              <a:buChar char="Ø"/>
-            </a:pPr>
-            <a:endParaRPr lang="pt-PT" dirty="0"/>
+            <a:pPr algn="ctr"/>
+            <a:r>
+              <a:rPr lang="pt-PT" b="1" dirty="0">
+                <a:latin typeface="MS UI Gothic" panose="020B0600070205080204" pitchFamily="34" charset="-128"/>
+                <a:ea typeface="MS UI Gothic" panose="020B0600070205080204" pitchFamily="34" charset="-128"/>
+              </a:rPr>
+              <a:t>Modelo Conceptual</a:t>
+            </a:r>
           </a:p>
         </p:txBody>
       </p:sp>
     </p:spTree>
     <p:extLst>
       <p:ext uri="{BB962C8B-B14F-4D97-AF65-F5344CB8AC3E}">
-        <p14:creationId xmlns:p14="http://schemas.microsoft.com/office/powerpoint/2010/main" val="2189927673"/>
+        <p14:creationId xmlns:p14="http://schemas.microsoft.com/office/powerpoint/2010/main" val="4224231161"/>
       </p:ext>
     </p:extLst>
   </p:cSld>
@@ -7380,7 +8619,21 @@
                 <a:latin typeface="MS UI Gothic" panose="020B0600070205080204" pitchFamily="34" charset="-128"/>
                 <a:ea typeface="MS UI Gothic" panose="020B0600070205080204" pitchFamily="34" charset="-128"/>
               </a:rPr>
-              <a:t>Carlos Pereira, João Barreira, Tiago Bouças e Tiago Duarte</a:t>
+              <a:t>Carlos Pereira, </a:t>
+            </a:r>
+            <a:r>
+              <a:rPr lang="pt-PT" sz="1400" b="1" u="sng" dirty="0">
+                <a:latin typeface="MS UI Gothic" panose="020B0600070205080204" pitchFamily="34" charset="-128"/>
+                <a:ea typeface="MS UI Gothic" panose="020B0600070205080204" pitchFamily="34" charset="-128"/>
+              </a:rPr>
+              <a:t>João Barreira</a:t>
+            </a:r>
+            <a:r>
+              <a:rPr lang="pt-PT" sz="1400" dirty="0">
+                <a:latin typeface="MS UI Gothic" panose="020B0600070205080204" pitchFamily="34" charset="-128"/>
+                <a:ea typeface="MS UI Gothic" panose="020B0600070205080204" pitchFamily="34" charset="-128"/>
+              </a:rPr>
+              <a:t>, Tiago Bouças e Tiago Duarte</a:t>
             </a:r>
           </a:p>
         </p:txBody>
@@ -7449,34 +8702,68 @@
       </p:pic>
       <p:pic>
         <p:nvPicPr>
-          <p:cNvPr id="13" name="Marcador de Posição de Conteúdo 3"/>
+          <p:cNvPr id="13" name="Imagem 12"/>
           <p:cNvPicPr>
-            <a:picLocks noGrp="1" noChangeAspect="1"/>
+            <a:picLocks noChangeAspect="1"/>
           </p:cNvPicPr>
-          <p:nvPr>
-            <p:ph idx="1"/>
-          </p:nvPr>
+          <p:nvPr/>
         </p:nvPicPr>
-        <p:blipFill>
-          <a:blip r:embed="rId4"/>
-          <a:stretch>
-            <a:fillRect/>
-          </a:stretch>
+        <p:blipFill rotWithShape="1">
+          <a:blip r:embed="rId4">
+            <a:extLst>
+              <a:ext uri="{28A0092B-C50C-407E-A947-70E740481C1C}">
+                <a14:useLocalDpi xmlns:a14="http://schemas.microsoft.com/office/drawing/2010/main" val="0"/>
+              </a:ext>
+            </a:extLst>
+          </a:blip>
+          <a:srcRect l="901" t="3561" r="-901" b="4999"/>
+          <a:stretch/>
         </p:blipFill>
         <p:spPr>
           <a:xfrm>
-            <a:off x="395536" y="411510"/>
-            <a:ext cx="8280920" cy="4104456"/>
+            <a:off x="599773" y="694368"/>
+            <a:ext cx="7992888" cy="4037622"/>
           </a:xfrm>
           <a:prstGeom prst="rect">
             <a:avLst/>
           </a:prstGeom>
         </p:spPr>
       </p:pic>
+      <p:sp>
+        <p:nvSpPr>
+          <p:cNvPr id="7" name="Título 1"/>
+          <p:cNvSpPr>
+            <a:spLocks noGrp="1"/>
+          </p:cNvSpPr>
+          <p:nvPr>
+            <p:ph type="title"/>
+          </p:nvPr>
+        </p:nvSpPr>
+        <p:spPr>
+          <a:xfrm>
+            <a:off x="755576" y="69093"/>
+            <a:ext cx="7704856" cy="558441"/>
+          </a:xfrm>
+        </p:spPr>
+        <p:txBody>
+          <a:bodyPr/>
+          <a:lstStyle/>
+          <a:p>
+            <a:pPr algn="ctr"/>
+            <a:r>
+              <a:rPr lang="pt-PT" b="1" dirty="0">
+                <a:latin typeface="MS UI Gothic" panose="020B0600070205080204" pitchFamily="34" charset="-128"/>
+                <a:ea typeface="MS UI Gothic" panose="020B0600070205080204" pitchFamily="34" charset="-128"/>
+              </a:rPr>
+              <a:t>Modelo Lógico</a:t>
+            </a:r>
+          </a:p>
+        </p:txBody>
+      </p:sp>
     </p:spTree>
     <p:extLst>
       <p:ext uri="{BB962C8B-B14F-4D97-AF65-F5344CB8AC3E}">
-        <p14:creationId xmlns:p14="http://schemas.microsoft.com/office/powerpoint/2010/main" val="4224231161"/>
+        <p14:creationId xmlns:p14="http://schemas.microsoft.com/office/powerpoint/2010/main" val="2955976015"/>
       </p:ext>
     </p:extLst>
   </p:cSld>
@@ -7529,7 +8816,7 @@
                 <a:latin typeface="MS UI Gothic" panose="020B0600070205080204" pitchFamily="34" charset="-128"/>
                 <a:ea typeface="MS UI Gothic" panose="020B0600070205080204" pitchFamily="34" charset="-128"/>
               </a:rPr>
-              <a:t>Construção do Modelo Lógico</a:t>
+              <a:t>Tabela bilhete</a:t>
             </a:r>
           </a:p>
         </p:txBody>
@@ -7561,7 +8848,21 @@
                 <a:latin typeface="MS UI Gothic" panose="020B0600070205080204" pitchFamily="34" charset="-128"/>
                 <a:ea typeface="MS UI Gothic" panose="020B0600070205080204" pitchFamily="34" charset="-128"/>
               </a:rPr>
-              <a:t>Carlos Pereira, João Barreira, Tiago Bouças e Tiago Duarte</a:t>
+              <a:t>Carlos Pereira, João Barreira, </a:t>
+            </a:r>
+            <a:r>
+              <a:rPr lang="pt-PT" sz="1400" b="1" u="sng" dirty="0">
+                <a:latin typeface="MS UI Gothic" panose="020B0600070205080204" pitchFamily="34" charset="-128"/>
+                <a:ea typeface="MS UI Gothic" panose="020B0600070205080204" pitchFamily="34" charset="-128"/>
+              </a:rPr>
+              <a:t>Tiago Bouças</a:t>
+            </a:r>
+            <a:r>
+              <a:rPr lang="pt-PT" sz="1400" dirty="0">
+                <a:latin typeface="MS UI Gothic" panose="020B0600070205080204" pitchFamily="34" charset="-128"/>
+                <a:ea typeface="MS UI Gothic" panose="020B0600070205080204" pitchFamily="34" charset="-128"/>
+              </a:rPr>
+              <a:t> e Tiago Duarte</a:t>
             </a:r>
           </a:p>
         </p:txBody>
@@ -7628,91 +8929,39 @@
           </a:prstGeom>
         </p:spPr>
       </p:pic>
-      <p:sp>
-        <p:nvSpPr>
-          <p:cNvPr id="7" name="Marcador de Posição de Conteúdo 2"/>
-          <p:cNvSpPr>
-            <a:spLocks noGrp="1"/>
-          </p:cNvSpPr>
+      <p:pic>
+        <p:nvPicPr>
+          <p:cNvPr id="7" name="Marcador de Posição de Conteúdo 6"/>
+          <p:cNvPicPr>
+            <a:picLocks noGrp="1" noChangeAspect="1"/>
+          </p:cNvPicPr>
           <p:nvPr>
             <p:ph idx="1"/>
           </p:nvPr>
-        </p:nvSpPr>
-        <p:spPr>
-          <a:xfrm>
-            <a:off x="850168" y="1779662"/>
-            <a:ext cx="7543800" cy="3017520"/>
-          </a:xfrm>
-        </p:spPr>
-        <p:txBody>
-          <a:bodyPr/>
-          <a:lstStyle/>
-          <a:p>
-            <a:pPr>
-              <a:buFont typeface="Wingdings" panose="05000000000000000000" pitchFamily="2" charset="2"/>
-              <a:buChar char="Ø"/>
-            </a:pPr>
-            <a:r>
-              <a:rPr lang="pt-PT" dirty="0"/>
-              <a:t>Derivação das relações a partir do Modelo Conceptual</a:t>
-            </a:r>
-          </a:p>
-          <a:p>
-            <a:pPr>
-              <a:buFont typeface="Wingdings" panose="05000000000000000000" pitchFamily="2" charset="2"/>
-              <a:buChar char="Ø"/>
-            </a:pPr>
-            <a:r>
-              <a:rPr lang="pt-PT" dirty="0"/>
-              <a:t>Validar relações usando a normalização</a:t>
-            </a:r>
-          </a:p>
-          <a:p>
-            <a:pPr>
-              <a:buFont typeface="Wingdings" panose="05000000000000000000" pitchFamily="2" charset="2"/>
-              <a:buChar char="Ø"/>
-            </a:pPr>
-            <a:r>
-              <a:rPr lang="pt-PT" dirty="0"/>
-              <a:t>Validar relações de acordo com as transações do utilizador</a:t>
-            </a:r>
-          </a:p>
-          <a:p>
-            <a:pPr>
-              <a:buFont typeface="Wingdings" panose="05000000000000000000" pitchFamily="2" charset="2"/>
-              <a:buChar char="Ø"/>
-            </a:pPr>
-            <a:r>
-              <a:rPr lang="pt-PT" dirty="0"/>
-              <a:t>Verificar integridade das restrições</a:t>
-            </a:r>
-          </a:p>
-          <a:p>
-            <a:pPr>
-              <a:buFont typeface="Wingdings" panose="05000000000000000000" pitchFamily="2" charset="2"/>
-              <a:buChar char="Ø"/>
-            </a:pPr>
-            <a:r>
-              <a:rPr lang="pt-PT" dirty="0"/>
-              <a:t>Rever modelo lógico com o utilizador</a:t>
-            </a:r>
-          </a:p>
-          <a:p>
-            <a:pPr>
-              <a:buFont typeface="Wingdings" panose="05000000000000000000" pitchFamily="2" charset="2"/>
-              <a:buChar char="Ø"/>
-            </a:pPr>
-            <a:r>
-              <a:rPr lang="pt-PT" dirty="0"/>
-              <a:t>Verificar futuro crescimento</a:t>
-            </a:r>
-          </a:p>
-        </p:txBody>
-      </p:sp>
+        </p:nvPicPr>
+        <p:blipFill>
+          <a:blip r:embed="rId4">
+            <a:extLst>
+              <a:ext uri="{28A0092B-C50C-407E-A947-70E740481C1C}">
+                <a14:useLocalDpi xmlns:a14="http://schemas.microsoft.com/office/drawing/2010/main" val="0"/>
+              </a:ext>
+            </a:extLst>
+          </a:blip>
+          <a:stretch>
+            <a:fillRect/>
+          </a:stretch>
+        </p:blipFill>
+        <p:spPr>
+          <a:xfrm>
+            <a:off x="2267744" y="1384300"/>
+            <a:ext cx="4433130" cy="3352864"/>
+          </a:xfrm>
+        </p:spPr>
+      </p:pic>
     </p:spTree>
     <p:extLst>
       <p:ext uri="{BB962C8B-B14F-4D97-AF65-F5344CB8AC3E}">
-        <p14:creationId xmlns:p14="http://schemas.microsoft.com/office/powerpoint/2010/main" val="191715248"/>
+        <p14:creationId xmlns:p14="http://schemas.microsoft.com/office/powerpoint/2010/main" val="2281289856"/>
       </p:ext>
     </p:extLst>
   </p:cSld>
@@ -7741,6 +8990,37 @@
       </p:grpSpPr>
       <p:sp>
         <p:nvSpPr>
+          <p:cNvPr id="2" name="Título 1"/>
+          <p:cNvSpPr>
+            <a:spLocks noGrp="1"/>
+          </p:cNvSpPr>
+          <p:nvPr>
+            <p:ph type="title"/>
+          </p:nvPr>
+        </p:nvSpPr>
+        <p:spPr>
+          <a:xfrm>
+            <a:off x="827584" y="267494"/>
+            <a:ext cx="7704856" cy="1088068"/>
+          </a:xfrm>
+        </p:spPr>
+        <p:txBody>
+          <a:bodyPr/>
+          <a:lstStyle/>
+          <a:p>
+            <a:pPr algn="ctr"/>
+            <a:r>
+              <a:rPr lang="pt-PT" b="1" dirty="0">
+                <a:latin typeface="MS UI Gothic" panose="020B0600070205080204" pitchFamily="34" charset="-128"/>
+                <a:ea typeface="MS UI Gothic" panose="020B0600070205080204" pitchFamily="34" charset="-128"/>
+              </a:rPr>
+              <a:t>Transação – Adicionar Bilhete</a:t>
+            </a:r>
+          </a:p>
+        </p:txBody>
+      </p:sp>
+      <p:sp>
+        <p:nvSpPr>
           <p:cNvPr id="4" name="CaixaDeTexto 3"/>
           <p:cNvSpPr txBox="1"/>
           <p:nvPr/>
@@ -7766,7 +9046,14 @@
                 <a:latin typeface="MS UI Gothic" panose="020B0600070205080204" pitchFamily="34" charset="-128"/>
                 <a:ea typeface="MS UI Gothic" panose="020B0600070205080204" pitchFamily="34" charset="-128"/>
               </a:rPr>
-              <a:t>Carlos Pereira, João Barreira, Tiago Bouças e Tiago Duarte</a:t>
+              <a:t>Carlos Pereira, João Barreira, Tiago Bouças e </a:t>
+            </a:r>
+            <a:r>
+              <a:rPr lang="pt-PT" sz="1400" b="1" u="sng" dirty="0">
+                <a:latin typeface="MS UI Gothic" panose="020B0600070205080204" pitchFamily="34" charset="-128"/>
+                <a:ea typeface="MS UI Gothic" panose="020B0600070205080204" pitchFamily="34" charset="-128"/>
+              </a:rPr>
+              <a:t>Tiago Duarte</a:t>
             </a:r>
           </a:p>
         </p:txBody>
@@ -7835,11 +9122,13 @@
       </p:pic>
       <p:pic>
         <p:nvPicPr>
-          <p:cNvPr id="13" name="Imagem 12"/>
+          <p:cNvPr id="12" name="Marcador de Posição de Conteúdo 3"/>
           <p:cNvPicPr>
-            <a:picLocks noChangeAspect="1"/>
+            <a:picLocks noGrp="1" noChangeAspect="1"/>
           </p:cNvPicPr>
-          <p:nvPr/>
+          <p:nvPr>
+            <p:ph idx="1"/>
+          </p:nvPr>
         </p:nvPicPr>
         <p:blipFill>
           <a:blip r:embed="rId4">
@@ -7855,8 +9144,35 @@
         </p:blipFill>
         <p:spPr>
           <a:xfrm>
-            <a:off x="539552" y="123478"/>
-            <a:ext cx="7992888" cy="4415551"/>
+            <a:off x="323528" y="1603002"/>
+            <a:ext cx="4113698" cy="3017838"/>
+          </a:xfrm>
+        </p:spPr>
+      </p:pic>
+      <p:pic>
+        <p:nvPicPr>
+          <p:cNvPr id="13" name="Imagem 12"/>
+          <p:cNvPicPr>
+            <a:picLocks noChangeAspect="1"/>
+          </p:cNvPicPr>
+          <p:nvPr/>
+        </p:nvPicPr>
+        <p:blipFill>
+          <a:blip r:embed="rId5">
+            <a:extLst>
+              <a:ext uri="{28A0092B-C50C-407E-A947-70E740481C1C}">
+                <a14:useLocalDpi xmlns:a14="http://schemas.microsoft.com/office/drawing/2010/main" val="0"/>
+              </a:ext>
+            </a:extLst>
+          </a:blip>
+          <a:stretch>
+            <a:fillRect/>
+          </a:stretch>
+        </p:blipFill>
+        <p:spPr>
+          <a:xfrm>
+            <a:off x="4666191" y="1603002"/>
+            <a:ext cx="4145749" cy="3134162"/>
           </a:xfrm>
           <a:prstGeom prst="rect">
             <a:avLst/>
@@ -7866,7 +9182,7 @@
     </p:spTree>
     <p:extLst>
       <p:ext uri="{BB962C8B-B14F-4D97-AF65-F5344CB8AC3E}">
-        <p14:creationId xmlns:p14="http://schemas.microsoft.com/office/powerpoint/2010/main" val="2955976015"/>
+        <p14:creationId xmlns:p14="http://schemas.microsoft.com/office/powerpoint/2010/main" val="4043336539"/>
       </p:ext>
     </p:extLst>
   </p:cSld>
@@ -7919,7 +9235,7 @@
                 <a:latin typeface="MS UI Gothic" panose="020B0600070205080204" pitchFamily="34" charset="-128"/>
                 <a:ea typeface="MS UI Gothic" panose="020B0600070205080204" pitchFamily="34" charset="-128"/>
               </a:rPr>
-              <a:t>Normalização</a:t>
+              <a:t>Vistas</a:t>
             </a:r>
           </a:p>
         </p:txBody>
@@ -7951,7 +9267,21 @@
                 <a:latin typeface="MS UI Gothic" panose="020B0600070205080204" pitchFamily="34" charset="-128"/>
                 <a:ea typeface="MS UI Gothic" panose="020B0600070205080204" pitchFamily="34" charset="-128"/>
               </a:rPr>
-              <a:t>Carlos Pereira, João Barreira, Tiago Bouças e Tiago Duarte</a:t>
+              <a:t>Carlos Pereira, João Barreira, </a:t>
+            </a:r>
+            <a:r>
+              <a:rPr lang="pt-PT" sz="1400" b="1" u="sng" dirty="0">
+                <a:latin typeface="MS UI Gothic" panose="020B0600070205080204" pitchFamily="34" charset="-128"/>
+                <a:ea typeface="MS UI Gothic" panose="020B0600070205080204" pitchFamily="34" charset="-128"/>
+              </a:rPr>
+              <a:t>Tiago Bouças </a:t>
+            </a:r>
+            <a:r>
+              <a:rPr lang="pt-PT" sz="1400" dirty="0">
+                <a:latin typeface="MS UI Gothic" panose="020B0600070205080204" pitchFamily="34" charset="-128"/>
+                <a:ea typeface="MS UI Gothic" panose="020B0600070205080204" pitchFamily="34" charset="-128"/>
+              </a:rPr>
+              <a:t>e Tiago Duarte</a:t>
             </a:r>
           </a:p>
         </p:txBody>
@@ -8020,7 +9350,7 @@
       </p:pic>
       <p:sp>
         <p:nvSpPr>
-          <p:cNvPr id="7" name="Marcador de Posição de Conteúdo 2"/>
+          <p:cNvPr id="10" name="Marcador de Posição de Conteúdo 9"/>
           <p:cNvSpPr>
             <a:spLocks noGrp="1"/>
           </p:cNvSpPr>
@@ -8030,7 +9360,7 @@
         </p:nvSpPr>
         <p:spPr>
           <a:xfrm>
-            <a:off x="850168" y="1779662"/>
+            <a:off x="822960" y="1384301"/>
             <a:ext cx="7543800" cy="3017520"/>
           </a:xfrm>
         </p:spPr>
@@ -8038,71 +9368,176 @@
           <a:bodyPr/>
           <a:lstStyle/>
           <a:p>
-            <a:pPr>
-              <a:buFont typeface="Wingdings" panose="05000000000000000000" pitchFamily="2" charset="2"/>
-              <a:buChar char="Ø"/>
-            </a:pPr>
-            <a:r>
-              <a:rPr lang="pt-PT" sz="1800" dirty="0"/>
-              <a:t>Primeira forma normal (1NF)</a:t>
-            </a:r>
-          </a:p>
-          <a:p>
-            <a:pPr lvl="2">
-              <a:buFont typeface="Wingdings" panose="05000000000000000000" pitchFamily="2" charset="2"/>
-              <a:buChar char="Ø"/>
-            </a:pPr>
-            <a:r>
-              <a:rPr lang="pt-PT" sz="1400" dirty="0"/>
-              <a:t>Atomicidade dos atributos – A interseção entre cada registo e cada atributo (i. e. cada célula) deve conter um e um só valor.</a:t>
-            </a:r>
-          </a:p>
-          <a:p>
-            <a:pPr>
-              <a:buFont typeface="Wingdings" panose="05000000000000000000" pitchFamily="2" charset="2"/>
-              <a:buChar char="Ø"/>
-            </a:pPr>
-            <a:r>
-              <a:rPr lang="pt-PT" sz="1800" dirty="0"/>
-              <a:t>Segunda forma normal (2NF)</a:t>
-            </a:r>
-          </a:p>
-          <a:p>
-            <a:pPr lvl="2">
-              <a:buFont typeface="Wingdings" panose="05000000000000000000" pitchFamily="2" charset="2"/>
-              <a:buChar char="Ø"/>
-            </a:pPr>
-            <a:r>
-              <a:rPr lang="pt-PT" sz="1400" dirty="0"/>
-              <a:t>Dependências parciais	 - Cada atributo não participante na chave primária é totalmente dependente desta.</a:t>
-            </a:r>
-          </a:p>
-          <a:p>
-            <a:pPr>
-              <a:buFont typeface="Wingdings" panose="05000000000000000000" pitchFamily="2" charset="2"/>
-              <a:buChar char="Ø"/>
-            </a:pPr>
-            <a:r>
-              <a:rPr lang="pt-PT" sz="1800" dirty="0"/>
-              <a:t>Terceira forma normal (3NF)</a:t>
-            </a:r>
-          </a:p>
-          <a:p>
-            <a:pPr lvl="2">
-              <a:buFont typeface="Wingdings" panose="05000000000000000000" pitchFamily="2" charset="2"/>
-              <a:buChar char="Ø"/>
-            </a:pPr>
-            <a:r>
-              <a:rPr lang="pt-PT" sz="1400" dirty="0"/>
-              <a:t>Dependências transitivas – Todos os atributos de uma tabela devem apenas poder ser determinados pela chave primária e não por qualquer outra coluna da tabela.</a:t>
-            </a:r>
-          </a:p>
-        </p:txBody>
-      </p:sp>
+            <a:endParaRPr lang="pt-PT" dirty="0"/>
+          </a:p>
+        </p:txBody>
+      </p:sp>
+      <p:pic>
+        <p:nvPicPr>
+          <p:cNvPr id="2050" name="Picture 2" descr="vis_reserva"/>
+          <p:cNvPicPr>
+            <a:picLocks noChangeAspect="1" noChangeArrowheads="1"/>
+          </p:cNvPicPr>
+          <p:nvPr/>
+        </p:nvPicPr>
+        <p:blipFill>
+          <a:blip r:embed="rId4">
+            <a:extLst>
+              <a:ext uri="{28A0092B-C50C-407E-A947-70E740481C1C}">
+                <a14:useLocalDpi xmlns:a14="http://schemas.microsoft.com/office/drawing/2010/main" val="0"/>
+              </a:ext>
+            </a:extLst>
+          </a:blip>
+          <a:srcRect/>
+          <a:stretch>
+            <a:fillRect/>
+          </a:stretch>
+        </p:blipFill>
+        <p:spPr bwMode="auto">
+          <a:xfrm>
+            <a:off x="822960" y="1350409"/>
+            <a:ext cx="5581650" cy="971550"/>
+          </a:xfrm>
+          <a:prstGeom prst="rect">
+            <a:avLst/>
+          </a:prstGeom>
+          <a:noFill/>
+          <a:ln>
+            <a:noFill/>
+          </a:ln>
+          <a:extLst>
+            <a:ext uri="{909E8E84-426E-40DD-AFC4-6F175D3DCCD1}">
+              <a14:hiddenFill xmlns:a14="http://schemas.microsoft.com/office/drawing/2010/main">
+                <a:solidFill>
+                  <a:srgbClr val="FFFFFF"/>
+                </a:solidFill>
+              </a14:hiddenFill>
+            </a:ext>
+            <a:ext uri="{91240B29-F687-4F45-9708-019B960494DF}">
+              <a14:hiddenLine xmlns:a14="http://schemas.microsoft.com/office/drawing/2010/main" w="9525">
+                <a:solidFill>
+                  <a:srgbClr val="000000"/>
+                </a:solidFill>
+                <a:miter lim="800000"/>
+                <a:headEnd/>
+                <a:tailEnd/>
+              </a14:hiddenLine>
+            </a:ext>
+          </a:extLst>
+        </p:spPr>
+      </p:pic>
+      <p:pic>
+        <p:nvPicPr>
+          <p:cNvPr id="2051" name="Picture 3" descr="viag_intern"/>
+          <p:cNvPicPr>
+            <a:picLocks noChangeAspect="1" noChangeArrowheads="1"/>
+          </p:cNvPicPr>
+          <p:nvPr/>
+        </p:nvPicPr>
+        <p:blipFill>
+          <a:blip r:embed="rId5">
+            <a:extLst>
+              <a:ext uri="{28A0092B-C50C-407E-A947-70E740481C1C}">
+                <a14:useLocalDpi xmlns:a14="http://schemas.microsoft.com/office/drawing/2010/main" val="0"/>
+              </a:ext>
+            </a:extLst>
+          </a:blip>
+          <a:srcRect/>
+          <a:stretch>
+            <a:fillRect/>
+          </a:stretch>
+        </p:blipFill>
+        <p:spPr bwMode="auto">
+          <a:xfrm>
+            <a:off x="2889241" y="2442930"/>
+            <a:ext cx="5495925" cy="1114425"/>
+          </a:xfrm>
+          <a:prstGeom prst="rect">
+            <a:avLst/>
+          </a:prstGeom>
+          <a:noFill/>
+          <a:ln>
+            <a:noFill/>
+          </a:ln>
+          <a:extLst>
+            <a:ext uri="{909E8E84-426E-40DD-AFC4-6F175D3DCCD1}">
+              <a14:hiddenFill xmlns:a14="http://schemas.microsoft.com/office/drawing/2010/main">
+                <a:solidFill>
+                  <a:srgbClr val="FFFFFF"/>
+                </a:solidFill>
+              </a14:hiddenFill>
+            </a:ext>
+            <a:ext uri="{91240B29-F687-4F45-9708-019B960494DF}">
+              <a14:hiddenLine xmlns:a14="http://schemas.microsoft.com/office/drawing/2010/main" w="9525">
+                <a:solidFill>
+                  <a:srgbClr val="000000"/>
+                </a:solidFill>
+                <a:miter lim="800000"/>
+                <a:headEnd/>
+                <a:tailEnd/>
+              </a14:hiddenLine>
+            </a:ext>
+          </a:extLst>
+        </p:spPr>
+      </p:pic>
+      <p:pic>
+        <p:nvPicPr>
+          <p:cNvPr id="2052" name="Picture 4" descr="vis_Bil"/>
+          <p:cNvPicPr>
+            <a:picLocks noChangeAspect="1" noChangeArrowheads="1"/>
+          </p:cNvPicPr>
+          <p:nvPr/>
+        </p:nvPicPr>
+        <p:blipFill>
+          <a:blip r:embed="rId6">
+            <a:extLst>
+              <a:ext uri="{28A0092B-C50C-407E-A947-70E740481C1C}">
+                <a14:useLocalDpi xmlns:a14="http://schemas.microsoft.com/office/drawing/2010/main" val="0"/>
+              </a:ext>
+            </a:extLst>
+          </a:blip>
+          <a:srcRect/>
+          <a:stretch>
+            <a:fillRect/>
+          </a:stretch>
+        </p:blipFill>
+        <p:spPr bwMode="auto">
+          <a:xfrm>
+            <a:off x="833743" y="3680920"/>
+            <a:ext cx="7144183" cy="687869"/>
+          </a:xfrm>
+          <a:prstGeom prst="rect">
+            <a:avLst/>
+          </a:prstGeom>
+          <a:noFill/>
+          <a:ln>
+            <a:noFill/>
+          </a:ln>
+          <a:extLst>
+            <a:ext uri="{909E8E84-426E-40DD-AFC4-6F175D3DCCD1}">
+              <a14:hiddenFill xmlns:a14="http://schemas.microsoft.com/office/drawing/2010/main">
+                <a:solidFill>
+                  <a:srgbClr val="FFFFFF"/>
+                </a:solidFill>
+              </a14:hiddenFill>
+            </a:ext>
+            <a:ext uri="{91240B29-F687-4F45-9708-019B960494DF}">
+              <a14:hiddenLine xmlns:a14="http://schemas.microsoft.com/office/drawing/2010/main" w="9525">
+                <a:solidFill>
+                  <a:srgbClr val="000000"/>
+                </a:solidFill>
+                <a:miter lim="800000"/>
+                <a:headEnd/>
+                <a:tailEnd/>
+              </a14:hiddenLine>
+            </a:ext>
+          </a:extLst>
+        </p:spPr>
+      </p:pic>
     </p:spTree>
     <p:extLst>
       <p:ext uri="{BB962C8B-B14F-4D97-AF65-F5344CB8AC3E}">
-        <p14:creationId xmlns:p14="http://schemas.microsoft.com/office/powerpoint/2010/main" val="981392183"/>
+        <p14:creationId xmlns:p14="http://schemas.microsoft.com/office/powerpoint/2010/main" val="3008859153"/>
       </p:ext>
     </p:extLst>
   </p:cSld>

</xml_diff>